<commit_message>
Fix number in flowchart
</commit_message>
<xml_diff>
--- a/results/flowchart.pptx
+++ b/results/flowchart.pptx
@@ -197,7 +197,7 @@
           <a:p>
             <a:fld id="{3EEE108C-EB67-DA4C-A2B8-5DDAA9AACF1E}" type="datetimeFigureOut">
               <a:rPr lang="de-CH" smtClean="0"/>
-              <a:t>25.04.23</a:t>
+              <a:t>05.06.2023</a:t>
             </a:fld>
             <a:endParaRPr lang="de-CH"/>
           </a:p>
@@ -1896,7 +1896,7 @@
             <a:fld id="{4B6055F8-1D02-4417-9241-55C834FD9970}" type="datetimeFigureOut">
               <a:rPr lang="it-IT" smtClean="0"/>
               <a:pPr/>
-              <a:t>25/04/23</a:t>
+              <a:t>05/06/2023</a:t>
             </a:fld>
             <a:endParaRPr lang="it-IT"/>
           </a:p>
@@ -4417,7 +4417,7 @@
               </a14:hiddenLine>
             </a:ext>
             <a:ext uri="{FAA26D3D-D897-4be2-8F04-BA451C77F1D7}">
-              <ma14:placeholderFlag xmlns="" xmlns:ma14="http://schemas.microsoft.com/office/mac/drawingml/2011/main" val="1"/>
+              <ma14:placeholderFlag xmlns:ma14="http://schemas.microsoft.com/office/mac/drawingml/2011/main" xmlns="" val="1"/>
             </a:ext>
           </a:extLst>
         </p:spPr>
@@ -4473,7 +4473,7 @@
               </a14:hiddenLine>
             </a:ext>
             <a:ext uri="{FAA26D3D-D897-4be2-8F04-BA451C77F1D7}">
-              <ma14:placeholderFlag xmlns="" xmlns:ma14="http://schemas.microsoft.com/office/mac/drawingml/2011/main" val="1"/>
+              <ma14:placeholderFlag xmlns:ma14="http://schemas.microsoft.com/office/mac/drawingml/2011/main" xmlns="" val="1"/>
             </a:ext>
           </a:extLst>
         </p:spPr>
@@ -4957,1270 +4957,1291 @@
           <a:chExt cx="0" cy="0"/>
         </a:xfrm>
       </p:grpSpPr>
-      <p:sp>
-        <p:nvSpPr>
-          <p:cNvPr id="26" name="Textfeld 7">
+      <p:grpSp>
+        <p:nvGrpSpPr>
+          <p:cNvPr id="2" name="Group 1">
             <a:extLst>
               <a:ext uri="{FF2B5EF4-FFF2-40B4-BE49-F238E27FC236}">
-                <a16:creationId xmlns:a16="http://schemas.microsoft.com/office/drawing/2014/main" id="{CA41E3C6-77E3-A9BA-388B-932070386B55}"/>
+                <a16:creationId xmlns:a16="http://schemas.microsoft.com/office/drawing/2014/main" id="{5EC7EC2C-BFE3-3C9A-23F0-3300D2AB775A}"/>
               </a:ext>
             </a:extLst>
           </p:cNvPr>
-          <p:cNvSpPr txBox="1"/>
+          <p:cNvGrpSpPr/>
           <p:nvPr/>
-        </p:nvSpPr>
-        <p:spPr>
+        </p:nvGrpSpPr>
+        <p:grpSpPr>
           <a:xfrm>
-            <a:off x="4396207" y="635295"/>
-            <a:ext cx="1723297" cy="492067"/>
+            <a:off x="1420301" y="635295"/>
+            <a:ext cx="9955628" cy="5658561"/>
+            <a:chOff x="1420301" y="635295"/>
+            <a:chExt cx="9955628" cy="5658561"/>
           </a:xfrm>
-          <a:prstGeom prst="rect">
-            <a:avLst/>
-          </a:prstGeom>
-          <a:noFill/>
-          <a:ln>
+        </p:grpSpPr>
+        <p:sp>
+          <p:nvSpPr>
+            <p:cNvPr id="26" name="Textfeld 7">
+              <a:extLst>
+                <a:ext uri="{FF2B5EF4-FFF2-40B4-BE49-F238E27FC236}">
+                  <a16:creationId xmlns:a16="http://schemas.microsoft.com/office/drawing/2014/main" id="{CA41E3C6-77E3-A9BA-388B-932070386B55}"/>
+                </a:ext>
+              </a:extLst>
+            </p:cNvPr>
+            <p:cNvSpPr txBox="1"/>
+            <p:nvPr/>
+          </p:nvSpPr>
+          <p:spPr>
+            <a:xfrm>
+              <a:off x="4396207" y="635295"/>
+              <a:ext cx="1723297" cy="492067"/>
+            </a:xfrm>
+            <a:prstGeom prst="rect">
+              <a:avLst/>
+            </a:prstGeom>
+            <a:noFill/>
+            <a:ln>
+              <a:solidFill>
+                <a:schemeClr val="tx1"/>
+              </a:solidFill>
+            </a:ln>
+          </p:spPr>
+          <p:txBody>
+            <a:bodyPr wrap="square" rtlCol="0" anchor="ctr" anchorCtr="0">
+              <a:noAutofit/>
+            </a:bodyPr>
+            <a:lstStyle/>
+            <a:p>
+              <a:pPr algn="ctr"/>
+              <a:r>
+                <a:rPr lang="en-US" sz="1200" dirty="0">
+                  <a:latin typeface="Arial" panose="020B0604020202020204" pitchFamily="34" charset="0"/>
+                  <a:cs typeface="Arial" panose="020B0604020202020204" pitchFamily="34" charset="0"/>
+                </a:rPr>
+                <a:t>73,140 ICU stays </a:t>
+              </a:r>
+            </a:p>
+            <a:p>
+              <a:pPr algn="ctr"/>
+              <a:r>
+                <a:rPr lang="en-US" sz="1200" dirty="0">
+                  <a:latin typeface="Arial" panose="020B0604020202020204" pitchFamily="34" charset="0"/>
+                  <a:cs typeface="Arial" panose="020B0604020202020204" pitchFamily="34" charset="0"/>
+                </a:rPr>
+                <a:t>in MIMIC-IV</a:t>
+              </a:r>
+            </a:p>
+          </p:txBody>
+        </p:sp>
+        <p:sp>
+          <p:nvSpPr>
+            <p:cNvPr id="27" name="Textfeld 10">
+              <a:extLst>
+                <a:ext uri="{FF2B5EF4-FFF2-40B4-BE49-F238E27FC236}">
+                  <a16:creationId xmlns:a16="http://schemas.microsoft.com/office/drawing/2014/main" id="{6CBAAC22-E24B-258F-6B8B-A77680B1792A}"/>
+                </a:ext>
+              </a:extLst>
+            </p:cNvPr>
+            <p:cNvSpPr txBox="1"/>
+            <p:nvPr/>
+          </p:nvSpPr>
+          <p:spPr>
+            <a:xfrm>
+              <a:off x="1426034" y="1127362"/>
+              <a:ext cx="2556000" cy="461665"/>
+            </a:xfrm>
+            <a:prstGeom prst="rect">
+              <a:avLst/>
+            </a:prstGeom>
+            <a:noFill/>
+            <a:ln>
+              <a:solidFill>
+                <a:schemeClr val="tx1"/>
+              </a:solidFill>
+            </a:ln>
+          </p:spPr>
+          <p:txBody>
+            <a:bodyPr wrap="square" rtlCol="0" anchor="ctr" anchorCtr="0">
+              <a:spAutoFit/>
+            </a:bodyPr>
+            <a:lstStyle/>
+            <a:p>
+              <a:r>
+                <a:rPr lang="en-US" sz="1200" dirty="0">
+                  <a:latin typeface="Arial" panose="020B0604020202020204" pitchFamily="34" charset="0"/>
+                  <a:cs typeface="Arial" panose="020B0604020202020204" pitchFamily="34" charset="0"/>
+                </a:rPr>
+                <a:t>Excluded: Non-Sepsis-3 stays </a:t>
+              </a:r>
+            </a:p>
+            <a:p>
+              <a:r>
+                <a:rPr lang="en-US" sz="1200" dirty="0">
+                  <a:latin typeface="Arial" panose="020B0604020202020204" pitchFamily="34" charset="0"/>
+                  <a:cs typeface="Arial" panose="020B0604020202020204" pitchFamily="34" charset="0"/>
+                </a:rPr>
+                <a:t>(n=40,169)</a:t>
+              </a:r>
+            </a:p>
+          </p:txBody>
+        </p:sp>
+        <p:cxnSp>
+          <p:nvCxnSpPr>
+            <p:cNvPr id="28" name="Gerade Verbindung mit Pfeil 12">
+              <a:extLst>
+                <a:ext uri="{FF2B5EF4-FFF2-40B4-BE49-F238E27FC236}">
+                  <a16:creationId xmlns:a16="http://schemas.microsoft.com/office/drawing/2014/main" id="{D03B28A3-5EFC-6874-EAE7-831A3076466E}"/>
+                </a:ext>
+              </a:extLst>
+            </p:cNvPr>
+            <p:cNvCxnSpPr>
+              <a:cxnSpLocks/>
+              <a:endCxn id="27" idx="3"/>
+            </p:cNvCxnSpPr>
+            <p:nvPr/>
+          </p:nvCxnSpPr>
+          <p:spPr>
+            <a:xfrm flipH="1">
+              <a:off x="3982034" y="1358195"/>
+              <a:ext cx="1275822" cy="0"/>
+            </a:xfrm>
+            <a:prstGeom prst="straightConnector1">
+              <a:avLst/>
+            </a:prstGeom>
+            <a:ln>
+              <a:tailEnd type="triangle"/>
+            </a:ln>
+          </p:spPr>
+          <p:style>
+            <a:lnRef idx="1">
+              <a:schemeClr val="dk1"/>
+            </a:lnRef>
+            <a:fillRef idx="0">
+              <a:schemeClr val="dk1"/>
+            </a:fillRef>
+            <a:effectRef idx="0">
+              <a:schemeClr val="dk1"/>
+            </a:effectRef>
+            <a:fontRef idx="minor">
+              <a:schemeClr val="tx1"/>
+            </a:fontRef>
+          </p:style>
+        </p:cxnSp>
+        <p:cxnSp>
+          <p:nvCxnSpPr>
+            <p:cNvPr id="29" name="Gerade Verbindung mit Pfeil 11">
+              <a:extLst>
+                <a:ext uri="{FF2B5EF4-FFF2-40B4-BE49-F238E27FC236}">
+                  <a16:creationId xmlns:a16="http://schemas.microsoft.com/office/drawing/2014/main" id="{77B3571F-2A91-06EC-EE2B-D74E80E4D91F}"/>
+                </a:ext>
+              </a:extLst>
+            </p:cNvPr>
+            <p:cNvCxnSpPr>
+              <a:cxnSpLocks/>
+              <a:stCxn id="26" idx="2"/>
+              <a:endCxn id="31" idx="0"/>
+            </p:cNvCxnSpPr>
+            <p:nvPr/>
+          </p:nvCxnSpPr>
+          <p:spPr>
+            <a:xfrm>
+              <a:off x="5257856" y="1127362"/>
+              <a:ext cx="0" cy="562211"/>
+            </a:xfrm>
+            <a:prstGeom prst="straightConnector1">
+              <a:avLst/>
+            </a:prstGeom>
+            <a:ln>
+              <a:tailEnd type="triangle"/>
+            </a:ln>
+          </p:spPr>
+          <p:style>
+            <a:lnRef idx="1">
+              <a:schemeClr val="dk1"/>
+            </a:lnRef>
+            <a:fillRef idx="0">
+              <a:schemeClr val="dk1"/>
+            </a:fillRef>
+            <a:effectRef idx="0">
+              <a:schemeClr val="dk1"/>
+            </a:effectRef>
+            <a:fontRef idx="minor">
+              <a:schemeClr val="tx1"/>
+            </a:fontRef>
+          </p:style>
+        </p:cxnSp>
+        <p:sp>
+          <p:nvSpPr>
+            <p:cNvPr id="31" name="Textfeld 7">
+              <a:extLst>
+                <a:ext uri="{FF2B5EF4-FFF2-40B4-BE49-F238E27FC236}">
+                  <a16:creationId xmlns:a16="http://schemas.microsoft.com/office/drawing/2014/main" id="{34765ADA-E96E-A17D-B35C-A820BA315A2E}"/>
+                </a:ext>
+              </a:extLst>
+            </p:cNvPr>
+            <p:cNvSpPr txBox="1"/>
+            <p:nvPr/>
+          </p:nvSpPr>
+          <p:spPr>
+            <a:xfrm>
+              <a:off x="4396207" y="1689573"/>
+              <a:ext cx="1723297" cy="644709"/>
+            </a:xfrm>
+            <a:prstGeom prst="rect">
+              <a:avLst/>
+            </a:prstGeom>
+            <a:noFill/>
+            <a:ln>
+              <a:solidFill>
+                <a:schemeClr val="tx1"/>
+              </a:solidFill>
+            </a:ln>
+          </p:spPr>
+          <p:txBody>
+            <a:bodyPr wrap="square" rtlCol="0" anchor="ctr" anchorCtr="0">
+              <a:noAutofit/>
+            </a:bodyPr>
+            <a:lstStyle>
+              <a:defPPr>
+                <a:defRPr lang="de-DE"/>
+              </a:defPPr>
+              <a:lvl1pPr algn="ctr">
+                <a:defRPr sz="1200">
+                  <a:latin typeface="Arial" panose="020B0604020202020204" pitchFamily="34" charset="0"/>
+                  <a:cs typeface="Arial" panose="020B0604020202020204" pitchFamily="34" charset="0"/>
+                </a:defRPr>
+              </a:lvl1pPr>
+            </a:lstStyle>
+            <a:p>
+              <a:r>
+                <a:rPr lang="en-US" dirty="0"/>
+                <a:t>32,971 ICU stays in MIMIC-IV</a:t>
+              </a:r>
+            </a:p>
+          </p:txBody>
+        </p:sp>
+        <p:sp>
+          <p:nvSpPr>
+            <p:cNvPr id="9" name="Textfeld 10">
+              <a:extLst>
+                <a:ext uri="{FF2B5EF4-FFF2-40B4-BE49-F238E27FC236}">
+                  <a16:creationId xmlns:a16="http://schemas.microsoft.com/office/drawing/2014/main" id="{598AA1A6-B27B-91CF-1B79-F0FF1C744259}"/>
+                </a:ext>
+              </a:extLst>
+            </p:cNvPr>
+            <p:cNvSpPr txBox="1"/>
+            <p:nvPr/>
+          </p:nvSpPr>
+          <p:spPr>
+            <a:xfrm>
+              <a:off x="1420301" y="3668513"/>
+              <a:ext cx="2556000" cy="461665"/>
+            </a:xfrm>
+            <a:prstGeom prst="rect">
+              <a:avLst/>
+            </a:prstGeom>
+            <a:noFill/>
+            <a:ln>
+              <a:solidFill>
+                <a:schemeClr val="tx1"/>
+              </a:solidFill>
+            </a:ln>
+          </p:spPr>
+          <p:txBody>
+            <a:bodyPr wrap="square" rtlCol="0" anchor="ctr" anchorCtr="0">
+              <a:spAutoFit/>
+            </a:bodyPr>
+            <a:lstStyle/>
+            <a:p>
+              <a:r>
+                <a:rPr lang="en-US" sz="1200" dirty="0">
+                  <a:latin typeface="Arial" panose="020B0604020202020204" pitchFamily="34" charset="0"/>
+                  <a:cs typeface="Arial" panose="020B0604020202020204" pitchFamily="34" charset="0"/>
+                </a:rPr>
+                <a:t>Excluded: Recurrent stays</a:t>
+              </a:r>
+            </a:p>
+            <a:p>
+              <a:r>
+                <a:rPr lang="en-US" sz="1200" dirty="0">
+                  <a:latin typeface="Arial" panose="020B0604020202020204" pitchFamily="34" charset="0"/>
+                  <a:cs typeface="Arial" panose="020B0604020202020204" pitchFamily="34" charset="0"/>
+                </a:rPr>
+                <a:t>(n=6,020)</a:t>
+              </a:r>
+            </a:p>
+          </p:txBody>
+        </p:sp>
+        <p:sp>
+          <p:nvSpPr>
+            <p:cNvPr id="36" name="Textfeld 7">
+              <a:extLst>
+                <a:ext uri="{FF2B5EF4-FFF2-40B4-BE49-F238E27FC236}">
+                  <a16:creationId xmlns:a16="http://schemas.microsoft.com/office/drawing/2014/main" id="{A1271EE3-ADCA-D508-3E25-0F2F89E4F0F6}"/>
+                </a:ext>
+              </a:extLst>
+            </p:cNvPr>
+            <p:cNvSpPr txBox="1"/>
+            <p:nvPr/>
+          </p:nvSpPr>
+          <p:spPr>
+            <a:xfrm>
+              <a:off x="4396207" y="2916602"/>
+              <a:ext cx="1723297" cy="644709"/>
+            </a:xfrm>
+            <a:prstGeom prst="rect">
+              <a:avLst/>
+            </a:prstGeom>
+            <a:noFill/>
+            <a:ln>
+              <a:solidFill>
+                <a:schemeClr val="tx1"/>
+              </a:solidFill>
+            </a:ln>
+          </p:spPr>
+          <p:txBody>
+            <a:bodyPr wrap="square" rtlCol="0" anchor="ctr" anchorCtr="0">
+              <a:noAutofit/>
+            </a:bodyPr>
+            <a:lstStyle>
+              <a:defPPr>
+                <a:defRPr lang="de-DE"/>
+              </a:defPPr>
+              <a:lvl1pPr algn="ctr">
+                <a:defRPr sz="1200">
+                  <a:latin typeface="Arial" panose="020B0604020202020204" pitchFamily="34" charset="0"/>
+                  <a:cs typeface="Arial" panose="020B0604020202020204" pitchFamily="34" charset="0"/>
+                </a:defRPr>
+              </a:lvl1pPr>
+            </a:lstStyle>
+            <a:p>
+              <a:r>
+                <a:rPr lang="en-US" dirty="0"/>
+                <a:t>29,421 septic ICU</a:t>
+              </a:r>
+              <a:br>
+                <a:rPr lang="en-US" dirty="0"/>
+              </a:br>
+              <a:r>
+                <a:rPr lang="en-US" dirty="0"/>
+                <a:t>stays in MIMIC-IV</a:t>
+              </a:r>
+            </a:p>
+          </p:txBody>
+        </p:sp>
+        <p:cxnSp>
+          <p:nvCxnSpPr>
+            <p:cNvPr id="38" name="Straight Arrow Connector 37">
+              <a:extLst>
+                <a:ext uri="{FF2B5EF4-FFF2-40B4-BE49-F238E27FC236}">
+                  <a16:creationId xmlns:a16="http://schemas.microsoft.com/office/drawing/2014/main" id="{F1B47FAF-9E03-4627-2C76-88D9C4567AE7}"/>
+                </a:ext>
+              </a:extLst>
+            </p:cNvPr>
+            <p:cNvCxnSpPr>
+              <a:stCxn id="31" idx="2"/>
+              <a:endCxn id="36" idx="0"/>
+            </p:cNvCxnSpPr>
+            <p:nvPr/>
+          </p:nvCxnSpPr>
+          <p:spPr bwMode="auto">
+            <a:xfrm>
+              <a:off x="5257856" y="2334282"/>
+              <a:ext cx="0" cy="582320"/>
+            </a:xfrm>
+            <a:prstGeom prst="straightConnector1">
+              <a:avLst/>
+            </a:prstGeom>
             <a:solidFill>
-              <a:schemeClr val="tx1"/>
+              <a:schemeClr val="accent1"/>
             </a:solidFill>
-          </a:ln>
-        </p:spPr>
-        <p:txBody>
-          <a:bodyPr wrap="square" rtlCol="0" anchor="ctr" anchorCtr="0">
-            <a:noAutofit/>
-          </a:bodyPr>
-          <a:lstStyle/>
-          <a:p>
-            <a:pPr algn="ctr"/>
-            <a:r>
-              <a:rPr lang="en-US" sz="1200" dirty="0">
-                <a:latin typeface="Arial" panose="020B0604020202020204" pitchFamily="34" charset="0"/>
-                <a:cs typeface="Arial" panose="020B0604020202020204" pitchFamily="34" charset="0"/>
-              </a:rPr>
-              <a:t>76,943 ICU stays </a:t>
-            </a:r>
-          </a:p>
-          <a:p>
-            <a:pPr algn="ctr"/>
-            <a:r>
-              <a:rPr lang="en-US" sz="1200" dirty="0">
-                <a:latin typeface="Arial" panose="020B0604020202020204" pitchFamily="34" charset="0"/>
-                <a:cs typeface="Arial" panose="020B0604020202020204" pitchFamily="34" charset="0"/>
-              </a:rPr>
-              <a:t>in MIMIC-IV</a:t>
-            </a:r>
-          </a:p>
-        </p:txBody>
-      </p:sp>
-      <p:sp>
-        <p:nvSpPr>
-          <p:cNvPr id="27" name="Textfeld 10">
-            <a:extLst>
-              <a:ext uri="{FF2B5EF4-FFF2-40B4-BE49-F238E27FC236}">
-                <a16:creationId xmlns:a16="http://schemas.microsoft.com/office/drawing/2014/main" id="{6CBAAC22-E24B-258F-6B8B-A77680B1792A}"/>
-              </a:ext>
-            </a:extLst>
-          </p:cNvPr>
-          <p:cNvSpPr txBox="1"/>
-          <p:nvPr/>
-        </p:nvSpPr>
-        <p:spPr>
-          <a:xfrm>
-            <a:off x="1426034" y="1127362"/>
-            <a:ext cx="2556000" cy="461665"/>
-          </a:xfrm>
-          <a:prstGeom prst="rect">
-            <a:avLst/>
-          </a:prstGeom>
-          <a:noFill/>
-          <a:ln>
+            <a:ln w="9525" cap="flat" cmpd="sng" algn="ctr">
+              <a:solidFill>
+                <a:schemeClr val="tx1"/>
+              </a:solidFill>
+              <a:prstDash val="solid"/>
+              <a:round/>
+              <a:headEnd type="none" w="med" len="med"/>
+              <a:tailEnd type="triangle"/>
+            </a:ln>
+            <a:effectLst/>
+          </p:spPr>
+        </p:cxnSp>
+        <p:sp>
+          <p:nvSpPr>
+            <p:cNvPr id="39" name="Textfeld 10">
+              <a:extLst>
+                <a:ext uri="{FF2B5EF4-FFF2-40B4-BE49-F238E27FC236}">
+                  <a16:creationId xmlns:a16="http://schemas.microsoft.com/office/drawing/2014/main" id="{98F131CA-82E4-8AC0-CC20-89C7DBB29D9D}"/>
+                </a:ext>
+              </a:extLst>
+            </p:cNvPr>
+            <p:cNvSpPr txBox="1"/>
+            <p:nvPr/>
+          </p:nvSpPr>
+          <p:spPr>
+            <a:xfrm>
+              <a:off x="1426034" y="2382721"/>
+              <a:ext cx="2556000" cy="461665"/>
+            </a:xfrm>
+            <a:prstGeom prst="rect">
+              <a:avLst/>
+            </a:prstGeom>
+            <a:noFill/>
+            <a:ln>
+              <a:solidFill>
+                <a:schemeClr val="tx1"/>
+              </a:solidFill>
+            </a:ln>
+          </p:spPr>
+          <p:txBody>
+            <a:bodyPr wrap="square" rtlCol="0" anchor="ctr" anchorCtr="0">
+              <a:spAutoFit/>
+            </a:bodyPr>
+            <a:lstStyle/>
+            <a:p>
+              <a:r>
+                <a:rPr lang="en-US" sz="1200" dirty="0">
+                  <a:latin typeface="Arial" panose="020B0604020202020204" pitchFamily="34" charset="0"/>
+                  <a:cs typeface="Arial" panose="020B0604020202020204" pitchFamily="34" charset="0"/>
+                </a:rPr>
+                <a:t>Excluded: Stays with LOS &lt;1 day or &gt;30 days (n= 3,550)</a:t>
+              </a:r>
+            </a:p>
+          </p:txBody>
+        </p:sp>
+        <p:cxnSp>
+          <p:nvCxnSpPr>
+            <p:cNvPr id="42" name="Straight Arrow Connector 41">
+              <a:extLst>
+                <a:ext uri="{FF2B5EF4-FFF2-40B4-BE49-F238E27FC236}">
+                  <a16:creationId xmlns:a16="http://schemas.microsoft.com/office/drawing/2014/main" id="{F223B246-5545-9CA7-042B-26F7A83249E6}"/>
+                </a:ext>
+              </a:extLst>
+            </p:cNvPr>
+            <p:cNvCxnSpPr>
+              <a:cxnSpLocks/>
+              <a:endCxn id="39" idx="3"/>
+            </p:cNvCxnSpPr>
+            <p:nvPr/>
+          </p:nvCxnSpPr>
+          <p:spPr bwMode="auto">
+            <a:xfrm flipH="1">
+              <a:off x="3982034" y="2613553"/>
+              <a:ext cx="1275822" cy="1"/>
+            </a:xfrm>
+            <a:prstGeom prst="straightConnector1">
+              <a:avLst/>
+            </a:prstGeom>
             <a:solidFill>
-              <a:schemeClr val="tx1"/>
+              <a:schemeClr val="accent1"/>
             </a:solidFill>
-          </a:ln>
-        </p:spPr>
-        <p:txBody>
-          <a:bodyPr wrap="square" rtlCol="0" anchor="ctr" anchorCtr="0">
-            <a:spAutoFit/>
-          </a:bodyPr>
-          <a:lstStyle/>
-          <a:p>
-            <a:r>
-              <a:rPr lang="en-US" sz="1200" dirty="0">
-                <a:latin typeface="Arial" panose="020B0604020202020204" pitchFamily="34" charset="0"/>
-                <a:cs typeface="Arial" panose="020B0604020202020204" pitchFamily="34" charset="0"/>
-              </a:rPr>
-              <a:t>Excluded: Non-Sepsis-3 stays </a:t>
-            </a:r>
-          </a:p>
-          <a:p>
-            <a:r>
-              <a:rPr lang="en-US" sz="1200" dirty="0">
-                <a:latin typeface="Arial" panose="020B0604020202020204" pitchFamily="34" charset="0"/>
-                <a:cs typeface="Arial" panose="020B0604020202020204" pitchFamily="34" charset="0"/>
-              </a:rPr>
-              <a:t>(n=40,169)</a:t>
-            </a:r>
-          </a:p>
-        </p:txBody>
-      </p:sp>
-      <p:cxnSp>
-        <p:nvCxnSpPr>
-          <p:cNvPr id="28" name="Gerade Verbindung mit Pfeil 12">
-            <a:extLst>
-              <a:ext uri="{FF2B5EF4-FFF2-40B4-BE49-F238E27FC236}">
-                <a16:creationId xmlns:a16="http://schemas.microsoft.com/office/drawing/2014/main" id="{D03B28A3-5EFC-6874-EAE7-831A3076466E}"/>
-              </a:ext>
-            </a:extLst>
-          </p:cNvPr>
-          <p:cNvCxnSpPr>
-            <a:cxnSpLocks/>
-            <a:endCxn id="27" idx="3"/>
-          </p:cNvCxnSpPr>
-          <p:nvPr/>
-        </p:nvCxnSpPr>
-        <p:spPr>
-          <a:xfrm flipH="1">
-            <a:off x="3982034" y="1358195"/>
-            <a:ext cx="1275822" cy="0"/>
-          </a:xfrm>
-          <a:prstGeom prst="straightConnector1">
-            <a:avLst/>
-          </a:prstGeom>
-          <a:ln>
-            <a:tailEnd type="triangle"/>
-          </a:ln>
-        </p:spPr>
-        <p:style>
-          <a:lnRef idx="1">
-            <a:schemeClr val="dk1"/>
-          </a:lnRef>
-          <a:fillRef idx="0">
-            <a:schemeClr val="dk1"/>
-          </a:fillRef>
-          <a:effectRef idx="0">
-            <a:schemeClr val="dk1"/>
-          </a:effectRef>
-          <a:fontRef idx="minor">
-            <a:schemeClr val="tx1"/>
-          </a:fontRef>
-        </p:style>
-      </p:cxnSp>
-      <p:cxnSp>
-        <p:nvCxnSpPr>
-          <p:cNvPr id="29" name="Gerade Verbindung mit Pfeil 11">
-            <a:extLst>
-              <a:ext uri="{FF2B5EF4-FFF2-40B4-BE49-F238E27FC236}">
-                <a16:creationId xmlns:a16="http://schemas.microsoft.com/office/drawing/2014/main" id="{77B3571F-2A91-06EC-EE2B-D74E80E4D91F}"/>
-              </a:ext>
-            </a:extLst>
-          </p:cNvPr>
-          <p:cNvCxnSpPr>
-            <a:cxnSpLocks/>
-            <a:stCxn id="26" idx="2"/>
-            <a:endCxn id="31" idx="0"/>
-          </p:cNvCxnSpPr>
-          <p:nvPr/>
-        </p:nvCxnSpPr>
-        <p:spPr>
-          <a:xfrm>
-            <a:off x="5257856" y="1127362"/>
-            <a:ext cx="0" cy="562211"/>
-          </a:xfrm>
-          <a:prstGeom prst="straightConnector1">
-            <a:avLst/>
-          </a:prstGeom>
-          <a:ln>
-            <a:tailEnd type="triangle"/>
-          </a:ln>
-        </p:spPr>
-        <p:style>
-          <a:lnRef idx="1">
-            <a:schemeClr val="dk1"/>
-          </a:lnRef>
-          <a:fillRef idx="0">
-            <a:schemeClr val="dk1"/>
-          </a:fillRef>
-          <a:effectRef idx="0">
-            <a:schemeClr val="dk1"/>
-          </a:effectRef>
-          <a:fontRef idx="minor">
-            <a:schemeClr val="tx1"/>
-          </a:fontRef>
-        </p:style>
-      </p:cxnSp>
-      <p:sp>
-        <p:nvSpPr>
-          <p:cNvPr id="31" name="Textfeld 7">
-            <a:extLst>
-              <a:ext uri="{FF2B5EF4-FFF2-40B4-BE49-F238E27FC236}">
-                <a16:creationId xmlns:a16="http://schemas.microsoft.com/office/drawing/2014/main" id="{34765ADA-E96E-A17D-B35C-A820BA315A2E}"/>
-              </a:ext>
-            </a:extLst>
-          </p:cNvPr>
-          <p:cNvSpPr txBox="1"/>
-          <p:nvPr/>
-        </p:nvSpPr>
-        <p:spPr>
-          <a:xfrm>
-            <a:off x="4396207" y="1689573"/>
-            <a:ext cx="1723297" cy="644709"/>
-          </a:xfrm>
-          <a:prstGeom prst="rect">
-            <a:avLst/>
-          </a:prstGeom>
-          <a:noFill/>
-          <a:ln>
+            <a:ln w="9525" cap="flat" cmpd="sng" algn="ctr">
+              <a:solidFill>
+                <a:schemeClr val="tx1"/>
+              </a:solidFill>
+              <a:prstDash val="solid"/>
+              <a:round/>
+              <a:headEnd type="none" w="med" len="med"/>
+              <a:tailEnd type="triangle"/>
+            </a:ln>
+            <a:effectLst/>
+          </p:spPr>
+        </p:cxnSp>
+        <p:sp>
+          <p:nvSpPr>
+            <p:cNvPr id="45" name="Textfeld 7">
+              <a:extLst>
+                <a:ext uri="{FF2B5EF4-FFF2-40B4-BE49-F238E27FC236}">
+                  <a16:creationId xmlns:a16="http://schemas.microsoft.com/office/drawing/2014/main" id="{3CDB5386-C388-15A6-8278-0333E2EFE7BB}"/>
+                </a:ext>
+              </a:extLst>
+            </p:cNvPr>
+            <p:cNvSpPr txBox="1"/>
+            <p:nvPr/>
+          </p:nvSpPr>
+          <p:spPr>
+            <a:xfrm>
+              <a:off x="4396207" y="5463671"/>
+              <a:ext cx="1723297" cy="644709"/>
+            </a:xfrm>
+            <a:prstGeom prst="rect">
+              <a:avLst/>
+            </a:prstGeom>
+            <a:noFill/>
+            <a:ln>
+              <a:solidFill>
+                <a:schemeClr val="tx1"/>
+              </a:solidFill>
+            </a:ln>
+          </p:spPr>
+          <p:txBody>
+            <a:bodyPr wrap="square" rtlCol="0" anchor="ctr" anchorCtr="0">
+              <a:noAutofit/>
+            </a:bodyPr>
+            <a:lstStyle>
+              <a:defPPr>
+                <a:defRPr lang="de-DE"/>
+              </a:defPPr>
+              <a:lvl1pPr algn="ctr">
+                <a:defRPr sz="1200">
+                  <a:latin typeface="Arial" panose="020B0604020202020204" pitchFamily="34" charset="0"/>
+                  <a:cs typeface="Arial" panose="020B0604020202020204" pitchFamily="34" charset="0"/>
+                </a:defRPr>
+              </a:lvl1pPr>
+            </a:lstStyle>
+            <a:p>
+              <a:r>
+                <a:rPr lang="en-US" dirty="0"/>
+                <a:t>19,419 septic ICU</a:t>
+              </a:r>
+              <a:br>
+                <a:rPr lang="en-US" dirty="0"/>
+              </a:br>
+              <a:r>
+                <a:rPr lang="en-US" dirty="0"/>
+                <a:t>stays in MIMIC-IV</a:t>
+              </a:r>
+            </a:p>
+          </p:txBody>
+        </p:sp>
+        <p:cxnSp>
+          <p:nvCxnSpPr>
+            <p:cNvPr id="49" name="Straight Arrow Connector 48">
+              <a:extLst>
+                <a:ext uri="{FF2B5EF4-FFF2-40B4-BE49-F238E27FC236}">
+                  <a16:creationId xmlns:a16="http://schemas.microsoft.com/office/drawing/2014/main" id="{D760F04E-81FF-2BB1-7BB5-961D1B5A2D32}"/>
+                </a:ext>
+              </a:extLst>
+            </p:cNvPr>
+            <p:cNvCxnSpPr>
+              <a:cxnSpLocks/>
+              <a:endCxn id="9" idx="3"/>
+            </p:cNvCxnSpPr>
+            <p:nvPr/>
+          </p:nvCxnSpPr>
+          <p:spPr bwMode="auto">
+            <a:xfrm flipH="1">
+              <a:off x="3976301" y="3899346"/>
+              <a:ext cx="1285513" cy="0"/>
+            </a:xfrm>
+            <a:prstGeom prst="straightConnector1">
+              <a:avLst/>
+            </a:prstGeom>
             <a:solidFill>
-              <a:schemeClr val="tx1"/>
+              <a:schemeClr val="accent1"/>
             </a:solidFill>
-          </a:ln>
-        </p:spPr>
-        <p:txBody>
-          <a:bodyPr wrap="square" rtlCol="0" anchor="ctr" anchorCtr="0">
-            <a:noAutofit/>
-          </a:bodyPr>
-          <a:lstStyle>
-            <a:defPPr>
-              <a:defRPr lang="de-DE"/>
-            </a:defPPr>
-            <a:lvl1pPr algn="ctr">
-              <a:defRPr sz="1200">
-                <a:latin typeface="Arial" panose="020B0604020202020204" pitchFamily="34" charset="0"/>
-                <a:cs typeface="Arial" panose="020B0604020202020204" pitchFamily="34" charset="0"/>
-              </a:defRPr>
-            </a:lvl1pPr>
-          </a:lstStyle>
-          <a:p>
-            <a:r>
-              <a:rPr lang="en-US" dirty="0"/>
-              <a:t>32,971 ICU stays in MIMIC-IV</a:t>
-            </a:r>
-          </a:p>
-        </p:txBody>
-      </p:sp>
-      <p:sp>
-        <p:nvSpPr>
-          <p:cNvPr id="9" name="Textfeld 10">
-            <a:extLst>
-              <a:ext uri="{FF2B5EF4-FFF2-40B4-BE49-F238E27FC236}">
-                <a16:creationId xmlns:a16="http://schemas.microsoft.com/office/drawing/2014/main" id="{598AA1A6-B27B-91CF-1B79-F0FF1C744259}"/>
-              </a:ext>
-            </a:extLst>
-          </p:cNvPr>
-          <p:cNvSpPr txBox="1"/>
-          <p:nvPr/>
-        </p:nvSpPr>
-        <p:spPr>
-          <a:xfrm>
-            <a:off x="1420301" y="3668513"/>
-            <a:ext cx="2556000" cy="461665"/>
-          </a:xfrm>
-          <a:prstGeom prst="rect">
-            <a:avLst/>
-          </a:prstGeom>
-          <a:noFill/>
-          <a:ln>
+            <a:ln w="9525" cap="flat" cmpd="sng" algn="ctr">
+              <a:solidFill>
+                <a:schemeClr val="tx1"/>
+              </a:solidFill>
+              <a:prstDash val="solid"/>
+              <a:round/>
+              <a:headEnd type="none" w="med" len="med"/>
+              <a:tailEnd type="triangle"/>
+            </a:ln>
+            <a:effectLst/>
+          </p:spPr>
+        </p:cxnSp>
+        <p:sp>
+          <p:nvSpPr>
+            <p:cNvPr id="3" name="Textfeld 7">
+              <a:extLst>
+                <a:ext uri="{FF2B5EF4-FFF2-40B4-BE49-F238E27FC236}">
+                  <a16:creationId xmlns:a16="http://schemas.microsoft.com/office/drawing/2014/main" id="{BFD17D97-DB1D-F584-7E11-C18A8EC746A2}"/>
+                </a:ext>
+              </a:extLst>
+            </p:cNvPr>
+            <p:cNvSpPr txBox="1"/>
+            <p:nvPr/>
+          </p:nvSpPr>
+          <p:spPr>
+            <a:xfrm>
+              <a:off x="4396207" y="4184843"/>
+              <a:ext cx="1723297" cy="644709"/>
+            </a:xfrm>
+            <a:prstGeom prst="rect">
+              <a:avLst/>
+            </a:prstGeom>
+            <a:noFill/>
+            <a:ln>
+              <a:solidFill>
+                <a:schemeClr val="tx1"/>
+              </a:solidFill>
+            </a:ln>
+          </p:spPr>
+          <p:txBody>
+            <a:bodyPr wrap="square" rtlCol="0" anchor="ctr" anchorCtr="0">
+              <a:noAutofit/>
+            </a:bodyPr>
+            <a:lstStyle>
+              <a:defPPr>
+                <a:defRPr lang="de-DE"/>
+              </a:defPPr>
+              <a:lvl1pPr algn="ctr">
+                <a:defRPr sz="1200">
+                  <a:latin typeface="Arial" panose="020B0604020202020204" pitchFamily="34" charset="0"/>
+                  <a:cs typeface="Arial" panose="020B0604020202020204" pitchFamily="34" charset="0"/>
+                </a:defRPr>
+              </a:lvl1pPr>
+            </a:lstStyle>
+            <a:p>
+              <a:r>
+                <a:rPr lang="en-US" dirty="0"/>
+                <a:t>23,401</a:t>
+              </a:r>
+              <a:r>
+                <a:rPr lang="en-US" b="1" dirty="0"/>
+                <a:t> </a:t>
+              </a:r>
+              <a:r>
+                <a:rPr lang="en-US" dirty="0"/>
+                <a:t>septic ICU</a:t>
+              </a:r>
+              <a:br>
+                <a:rPr lang="en-US" dirty="0"/>
+              </a:br>
+              <a:r>
+                <a:rPr lang="en-US" dirty="0"/>
+                <a:t>stays in MIMIC-IV</a:t>
+              </a:r>
+            </a:p>
+          </p:txBody>
+        </p:sp>
+        <p:cxnSp>
+          <p:nvCxnSpPr>
+            <p:cNvPr id="5" name="Straight Arrow Connector 4">
+              <a:extLst>
+                <a:ext uri="{FF2B5EF4-FFF2-40B4-BE49-F238E27FC236}">
+                  <a16:creationId xmlns:a16="http://schemas.microsoft.com/office/drawing/2014/main" id="{A4F110D5-B71D-DDC5-DECD-D605B2F658C7}"/>
+                </a:ext>
+              </a:extLst>
+            </p:cNvPr>
+            <p:cNvCxnSpPr>
+              <a:stCxn id="36" idx="2"/>
+              <a:endCxn id="3" idx="0"/>
+            </p:cNvCxnSpPr>
+            <p:nvPr/>
+          </p:nvCxnSpPr>
+          <p:spPr bwMode="auto">
+            <a:xfrm>
+              <a:off x="5257856" y="3561311"/>
+              <a:ext cx="0" cy="623532"/>
+            </a:xfrm>
+            <a:prstGeom prst="straightConnector1">
+              <a:avLst/>
+            </a:prstGeom>
             <a:solidFill>
-              <a:schemeClr val="tx1"/>
+              <a:schemeClr val="accent1"/>
             </a:solidFill>
-          </a:ln>
-        </p:spPr>
-        <p:txBody>
-          <a:bodyPr wrap="square" rtlCol="0" anchor="ctr" anchorCtr="0">
-            <a:spAutoFit/>
-          </a:bodyPr>
-          <a:lstStyle/>
-          <a:p>
-            <a:r>
-              <a:rPr lang="en-US" sz="1200" dirty="0">
-                <a:latin typeface="Arial" panose="020B0604020202020204" pitchFamily="34" charset="0"/>
-                <a:cs typeface="Arial" panose="020B0604020202020204" pitchFamily="34" charset="0"/>
-              </a:rPr>
-              <a:t>Excluded: Recurrent stays</a:t>
-            </a:r>
-          </a:p>
-          <a:p>
-            <a:r>
-              <a:rPr lang="en-US" sz="1200" dirty="0">
-                <a:latin typeface="Arial" panose="020B0604020202020204" pitchFamily="34" charset="0"/>
-                <a:cs typeface="Arial" panose="020B0604020202020204" pitchFamily="34" charset="0"/>
-              </a:rPr>
-              <a:t>(n=6,020)</a:t>
-            </a:r>
-          </a:p>
-        </p:txBody>
-      </p:sp>
-      <p:sp>
-        <p:nvSpPr>
-          <p:cNvPr id="36" name="Textfeld 7">
-            <a:extLst>
-              <a:ext uri="{FF2B5EF4-FFF2-40B4-BE49-F238E27FC236}">
-                <a16:creationId xmlns:a16="http://schemas.microsoft.com/office/drawing/2014/main" id="{A1271EE3-ADCA-D508-3E25-0F2F89E4F0F6}"/>
-              </a:ext>
-            </a:extLst>
-          </p:cNvPr>
-          <p:cNvSpPr txBox="1"/>
-          <p:nvPr/>
-        </p:nvSpPr>
-        <p:spPr>
-          <a:xfrm>
-            <a:off x="4396207" y="2916602"/>
-            <a:ext cx="1723297" cy="644709"/>
-          </a:xfrm>
-          <a:prstGeom prst="rect">
-            <a:avLst/>
-          </a:prstGeom>
-          <a:noFill/>
-          <a:ln>
+            <a:ln w="9525" cap="flat" cmpd="sng" algn="ctr">
+              <a:solidFill>
+                <a:schemeClr val="tx1"/>
+              </a:solidFill>
+              <a:prstDash val="solid"/>
+              <a:round/>
+              <a:headEnd type="none" w="med" len="med"/>
+              <a:tailEnd type="triangle"/>
+            </a:ln>
+            <a:effectLst/>
+          </p:spPr>
+        </p:cxnSp>
+        <p:sp>
+          <p:nvSpPr>
+            <p:cNvPr id="12" name="Textfeld 10">
+              <a:extLst>
+                <a:ext uri="{FF2B5EF4-FFF2-40B4-BE49-F238E27FC236}">
+                  <a16:creationId xmlns:a16="http://schemas.microsoft.com/office/drawing/2014/main" id="{9803919A-D35D-6474-2286-6581CD2C024B}"/>
+                </a:ext>
+              </a:extLst>
+            </p:cNvPr>
+            <p:cNvSpPr txBox="1"/>
+            <p:nvPr/>
+          </p:nvSpPr>
+          <p:spPr>
+            <a:xfrm>
+              <a:off x="1420301" y="4867219"/>
+              <a:ext cx="2556000" cy="461665"/>
+            </a:xfrm>
+            <a:prstGeom prst="rect">
+              <a:avLst/>
+            </a:prstGeom>
+            <a:noFill/>
+            <a:ln>
+              <a:solidFill>
+                <a:schemeClr val="tx1"/>
+              </a:solidFill>
+            </a:ln>
+          </p:spPr>
+          <p:txBody>
+            <a:bodyPr wrap="square" rtlCol="0" anchor="ctr" anchorCtr="0">
+              <a:spAutoFit/>
+            </a:bodyPr>
+            <a:lstStyle/>
+            <a:p>
+              <a:r>
+                <a:rPr lang="en-US" sz="1200" dirty="0">
+                  <a:latin typeface="Arial" panose="020B0604020202020204" pitchFamily="34" charset="0"/>
+                  <a:cs typeface="Arial" panose="020B0604020202020204" pitchFamily="34" charset="0"/>
+                </a:rPr>
+                <a:t>Excluded: Stays with race unknown or other (n= 3,982)</a:t>
+              </a:r>
+            </a:p>
+          </p:txBody>
+        </p:sp>
+        <p:cxnSp>
+          <p:nvCxnSpPr>
+            <p:cNvPr id="13" name="Straight Arrow Connector 12">
+              <a:extLst>
+                <a:ext uri="{FF2B5EF4-FFF2-40B4-BE49-F238E27FC236}">
+                  <a16:creationId xmlns:a16="http://schemas.microsoft.com/office/drawing/2014/main" id="{33A292FB-99CA-9674-D2DF-D5924A981FA7}"/>
+                </a:ext>
+              </a:extLst>
+            </p:cNvPr>
+            <p:cNvCxnSpPr>
+              <a:cxnSpLocks/>
+              <a:endCxn id="12" idx="3"/>
+            </p:cNvCxnSpPr>
+            <p:nvPr/>
+          </p:nvCxnSpPr>
+          <p:spPr bwMode="auto">
+            <a:xfrm flipH="1" flipV="1">
+              <a:off x="3976301" y="5098052"/>
+              <a:ext cx="1289005" cy="2340"/>
+            </a:xfrm>
+            <a:prstGeom prst="straightConnector1">
+              <a:avLst/>
+            </a:prstGeom>
             <a:solidFill>
-              <a:schemeClr val="tx1"/>
+              <a:schemeClr val="accent1"/>
             </a:solidFill>
-          </a:ln>
-        </p:spPr>
-        <p:txBody>
-          <a:bodyPr wrap="square" rtlCol="0" anchor="ctr" anchorCtr="0">
-            <a:noAutofit/>
-          </a:bodyPr>
-          <a:lstStyle>
-            <a:defPPr>
-              <a:defRPr lang="de-DE"/>
-            </a:defPPr>
-            <a:lvl1pPr algn="ctr">
-              <a:defRPr sz="1200">
-                <a:latin typeface="Arial" panose="020B0604020202020204" pitchFamily="34" charset="0"/>
-                <a:cs typeface="Arial" panose="020B0604020202020204" pitchFamily="34" charset="0"/>
-              </a:defRPr>
-            </a:lvl1pPr>
-          </a:lstStyle>
-          <a:p>
-            <a:r>
-              <a:rPr lang="en-US" dirty="0"/>
-              <a:t>29,421 septic ICU</a:t>
-            </a:r>
-            <a:br>
-              <a:rPr lang="en-US" dirty="0"/>
-            </a:br>
-            <a:r>
-              <a:rPr lang="en-US" dirty="0"/>
-              <a:t>stays in MIMIC-IV</a:t>
-            </a:r>
-          </a:p>
-        </p:txBody>
-      </p:sp>
-      <p:cxnSp>
-        <p:nvCxnSpPr>
-          <p:cNvPr id="38" name="Straight Arrow Connector 37">
-            <a:extLst>
-              <a:ext uri="{FF2B5EF4-FFF2-40B4-BE49-F238E27FC236}">
-                <a16:creationId xmlns:a16="http://schemas.microsoft.com/office/drawing/2014/main" id="{F1B47FAF-9E03-4627-2C76-88D9C4567AE7}"/>
-              </a:ext>
-            </a:extLst>
-          </p:cNvPr>
-          <p:cNvCxnSpPr>
-            <a:stCxn id="31" idx="2"/>
-            <a:endCxn id="36" idx="0"/>
-          </p:cNvCxnSpPr>
-          <p:nvPr/>
-        </p:nvCxnSpPr>
-        <p:spPr bwMode="auto">
-          <a:xfrm>
-            <a:off x="5257856" y="2334282"/>
-            <a:ext cx="0" cy="582320"/>
-          </a:xfrm>
-          <a:prstGeom prst="straightConnector1">
-            <a:avLst/>
-          </a:prstGeom>
-          <a:solidFill>
-            <a:schemeClr val="accent1"/>
-          </a:solidFill>
-          <a:ln w="9525" cap="flat" cmpd="sng" algn="ctr">
+            <a:ln w="9525" cap="flat" cmpd="sng" algn="ctr">
+              <a:solidFill>
+                <a:schemeClr val="tx1"/>
+              </a:solidFill>
+              <a:prstDash val="solid"/>
+              <a:round/>
+              <a:headEnd type="none" w="med" len="med"/>
+              <a:tailEnd type="triangle"/>
+            </a:ln>
+            <a:effectLst/>
+          </p:spPr>
+        </p:cxnSp>
+        <p:cxnSp>
+          <p:nvCxnSpPr>
+            <p:cNvPr id="16" name="Straight Arrow Connector 15">
+              <a:extLst>
+                <a:ext uri="{FF2B5EF4-FFF2-40B4-BE49-F238E27FC236}">
+                  <a16:creationId xmlns:a16="http://schemas.microsoft.com/office/drawing/2014/main" id="{ECB7953F-D68A-439F-D8CD-D3A62EF6D192}"/>
+                </a:ext>
+              </a:extLst>
+            </p:cNvPr>
+            <p:cNvCxnSpPr>
+              <a:cxnSpLocks/>
+              <a:stCxn id="3" idx="3"/>
+            </p:cNvCxnSpPr>
+            <p:nvPr/>
+          </p:nvCxnSpPr>
+          <p:spPr bwMode="auto">
+            <a:xfrm flipV="1">
+              <a:off x="6119504" y="4507197"/>
+              <a:ext cx="883566" cy="1"/>
+            </a:xfrm>
+            <a:prstGeom prst="straightConnector1">
+              <a:avLst/>
+            </a:prstGeom>
             <a:solidFill>
-              <a:schemeClr val="tx1"/>
+              <a:schemeClr val="accent1"/>
             </a:solidFill>
-            <a:prstDash val="solid"/>
-            <a:round/>
-            <a:headEnd type="none" w="med" len="med"/>
-            <a:tailEnd type="triangle"/>
-          </a:ln>
-          <a:effectLst/>
-        </p:spPr>
-      </p:cxnSp>
-      <p:sp>
-        <p:nvSpPr>
-          <p:cNvPr id="39" name="Textfeld 10">
-            <a:extLst>
-              <a:ext uri="{FF2B5EF4-FFF2-40B4-BE49-F238E27FC236}">
-                <a16:creationId xmlns:a16="http://schemas.microsoft.com/office/drawing/2014/main" id="{98F131CA-82E4-8AC0-CC20-89C7DBB29D9D}"/>
-              </a:ext>
-            </a:extLst>
-          </p:cNvPr>
-          <p:cNvSpPr txBox="1"/>
-          <p:nvPr/>
-        </p:nvSpPr>
-        <p:spPr>
-          <a:xfrm>
-            <a:off x="1426034" y="2382721"/>
-            <a:ext cx="2556000" cy="461665"/>
-          </a:xfrm>
-          <a:prstGeom prst="rect">
-            <a:avLst/>
-          </a:prstGeom>
-          <a:noFill/>
-          <a:ln>
+            <a:ln w="9525" cap="flat" cmpd="sng" algn="ctr">
+              <a:solidFill>
+                <a:schemeClr val="tx1"/>
+              </a:solidFill>
+              <a:prstDash val="solid"/>
+              <a:round/>
+              <a:headEnd type="none" w="med" len="med"/>
+              <a:tailEnd type="triangle"/>
+            </a:ln>
+            <a:effectLst/>
+          </p:spPr>
+        </p:cxnSp>
+        <p:cxnSp>
+          <p:nvCxnSpPr>
+            <p:cNvPr id="19" name="Straight Arrow Connector 18">
+              <a:extLst>
+                <a:ext uri="{FF2B5EF4-FFF2-40B4-BE49-F238E27FC236}">
+                  <a16:creationId xmlns:a16="http://schemas.microsoft.com/office/drawing/2014/main" id="{3D045019-133A-68E3-26F9-A8B41D5D70D3}"/>
+                </a:ext>
+              </a:extLst>
+            </p:cNvPr>
+            <p:cNvCxnSpPr>
+              <a:cxnSpLocks/>
+            </p:cNvCxnSpPr>
+            <p:nvPr/>
+          </p:nvCxnSpPr>
+          <p:spPr bwMode="auto">
+            <a:xfrm flipV="1">
+              <a:off x="6119504" y="5803737"/>
+              <a:ext cx="883566" cy="1"/>
+            </a:xfrm>
+            <a:prstGeom prst="straightConnector1">
+              <a:avLst/>
+            </a:prstGeom>
             <a:solidFill>
-              <a:schemeClr val="tx1"/>
+              <a:schemeClr val="accent1"/>
             </a:solidFill>
-          </a:ln>
-        </p:spPr>
-        <p:txBody>
-          <a:bodyPr wrap="square" rtlCol="0" anchor="ctr" anchorCtr="0">
-            <a:spAutoFit/>
-          </a:bodyPr>
-          <a:lstStyle/>
-          <a:p>
-            <a:r>
-              <a:rPr lang="en-US" sz="1200" dirty="0">
-                <a:latin typeface="Arial" panose="020B0604020202020204" pitchFamily="34" charset="0"/>
-                <a:cs typeface="Arial" panose="020B0604020202020204" pitchFamily="34" charset="0"/>
-              </a:rPr>
-              <a:t>Excluded: Stays with LOS &lt;1 day or &gt;30 days (n= 3,550)</a:t>
-            </a:r>
-          </a:p>
-        </p:txBody>
-      </p:sp>
-      <p:cxnSp>
-        <p:nvCxnSpPr>
-          <p:cNvPr id="42" name="Straight Arrow Connector 41">
-            <a:extLst>
-              <a:ext uri="{FF2B5EF4-FFF2-40B4-BE49-F238E27FC236}">
-                <a16:creationId xmlns:a16="http://schemas.microsoft.com/office/drawing/2014/main" id="{F223B246-5545-9CA7-042B-26F7A83249E6}"/>
-              </a:ext>
-            </a:extLst>
-          </p:cNvPr>
-          <p:cNvCxnSpPr>
-            <a:cxnSpLocks/>
-            <a:endCxn id="39" idx="3"/>
-          </p:cNvCxnSpPr>
-          <p:nvPr/>
-        </p:nvCxnSpPr>
-        <p:spPr bwMode="auto">
-          <a:xfrm flipH="1">
-            <a:off x="3982034" y="2613553"/>
-            <a:ext cx="1275822" cy="1"/>
-          </a:xfrm>
-          <a:prstGeom prst="straightConnector1">
-            <a:avLst/>
-          </a:prstGeom>
-          <a:solidFill>
-            <a:schemeClr val="accent1"/>
-          </a:solidFill>
-          <a:ln w="9525" cap="flat" cmpd="sng" algn="ctr">
+            <a:ln w="9525" cap="flat" cmpd="sng" algn="ctr">
+              <a:solidFill>
+                <a:schemeClr val="tx1"/>
+              </a:solidFill>
+              <a:prstDash val="solid"/>
+              <a:round/>
+              <a:headEnd type="none" w="med" len="med"/>
+              <a:tailEnd type="triangle"/>
+            </a:ln>
+            <a:effectLst/>
+          </p:spPr>
+        </p:cxnSp>
+        <p:sp>
+          <p:nvSpPr>
+            <p:cNvPr id="6" name="Textfeld 10">
+              <a:extLst>
+                <a:ext uri="{FF2B5EF4-FFF2-40B4-BE49-F238E27FC236}">
+                  <a16:creationId xmlns:a16="http://schemas.microsoft.com/office/drawing/2014/main" id="{5F77A8F6-B0C3-9DDA-CB0B-F91D629A1EB5}"/>
+                </a:ext>
+              </a:extLst>
+            </p:cNvPr>
+            <p:cNvSpPr txBox="1"/>
+            <p:nvPr/>
+          </p:nvSpPr>
+          <p:spPr>
+            <a:xfrm>
+              <a:off x="7006624" y="1504094"/>
+              <a:ext cx="4365749" cy="1015663"/>
+            </a:xfrm>
+            <a:prstGeom prst="rect">
+              <a:avLst/>
+            </a:prstGeom>
             <a:solidFill>
-              <a:schemeClr val="tx1"/>
+              <a:schemeClr val="bg2">
+                <a:lumMod val="40000"/>
+                <a:lumOff val="60000"/>
+              </a:schemeClr>
             </a:solidFill>
-            <a:prstDash val="solid"/>
-            <a:round/>
-            <a:headEnd type="none" w="med" len="med"/>
-            <a:tailEnd type="triangle"/>
-          </a:ln>
-          <a:effectLst/>
-        </p:spPr>
-      </p:cxnSp>
-      <p:sp>
-        <p:nvSpPr>
-          <p:cNvPr id="45" name="Textfeld 7">
-            <a:extLst>
-              <a:ext uri="{FF2B5EF4-FFF2-40B4-BE49-F238E27FC236}">
-                <a16:creationId xmlns:a16="http://schemas.microsoft.com/office/drawing/2014/main" id="{3CDB5386-C388-15A6-8278-0333E2EFE7BB}"/>
-              </a:ext>
-            </a:extLst>
-          </p:cNvPr>
-          <p:cNvSpPr txBox="1"/>
-          <p:nvPr/>
-        </p:nvSpPr>
-        <p:spPr>
-          <a:xfrm>
-            <a:off x="4396207" y="5463671"/>
-            <a:ext cx="1723297" cy="644709"/>
-          </a:xfrm>
-          <a:prstGeom prst="rect">
-            <a:avLst/>
-          </a:prstGeom>
-          <a:noFill/>
-          <a:ln>
+            <a:ln>
+              <a:solidFill>
+                <a:schemeClr val="tx1"/>
+              </a:solidFill>
+            </a:ln>
+          </p:spPr>
+          <p:txBody>
+            <a:bodyPr wrap="square" rtlCol="0" anchor="ctr" anchorCtr="0">
+              <a:spAutoFit/>
+            </a:bodyPr>
+            <a:lstStyle/>
+            <a:p>
+              <a:r>
+                <a:rPr lang="en-US" sz="1200" dirty="0">
+                  <a:latin typeface="Arial" panose="020B0604020202020204" pitchFamily="34" charset="0"/>
+                  <a:cs typeface="Arial" panose="020B0604020202020204" pitchFamily="34" charset="0"/>
+                </a:rPr>
+                <a:t>Cohort composition:</a:t>
+              </a:r>
+            </a:p>
+            <a:p>
+              <a:r>
+                <a:rPr lang="en-US" sz="1200" dirty="0">
+                  <a:latin typeface="Arial" panose="020B0604020202020204" pitchFamily="34" charset="0"/>
+                  <a:cs typeface="Arial" panose="020B0604020202020204" pitchFamily="34" charset="0"/>
+                </a:rPr>
+                <a:t>Race: Black 10.2%, White 68.2%, Asian 2.9%, Hispanic 3.7%</a:t>
+              </a:r>
+            </a:p>
+            <a:p>
+              <a:r>
+                <a:rPr lang="en-US" sz="1200" dirty="0">
+                  <a:latin typeface="Arial" panose="020B0604020202020204" pitchFamily="34" charset="0"/>
+                  <a:cs typeface="Arial" panose="020B0604020202020204" pitchFamily="34" charset="0"/>
+                </a:rPr>
+                <a:t>Sex: Male 57.8%, Female 42.2%</a:t>
+              </a:r>
+            </a:p>
+            <a:p>
+              <a:r>
+                <a:rPr lang="en-US" sz="1200" dirty="0">
+                  <a:latin typeface="Arial" panose="020B0604020202020204" pitchFamily="34" charset="0"/>
+                  <a:cs typeface="Arial" panose="020B0604020202020204" pitchFamily="34" charset="0"/>
+                </a:rPr>
+                <a:t>Limited English Proficiency: 10.8%</a:t>
+              </a:r>
+            </a:p>
+            <a:p>
+              <a:r>
+                <a:rPr lang="en-US" sz="1200" dirty="0">
+                  <a:latin typeface="Arial" panose="020B0604020202020204" pitchFamily="34" charset="0"/>
+                  <a:cs typeface="Arial" panose="020B0604020202020204" pitchFamily="34" charset="0"/>
+                </a:rPr>
+                <a:t>Insurance: Medicare/Medicaid 56.3%, Other: 43.7%</a:t>
+              </a:r>
+            </a:p>
+          </p:txBody>
+        </p:sp>
+        <p:cxnSp>
+          <p:nvCxnSpPr>
+            <p:cNvPr id="8" name="Straight Arrow Connector 7">
+              <a:extLst>
+                <a:ext uri="{FF2B5EF4-FFF2-40B4-BE49-F238E27FC236}">
+                  <a16:creationId xmlns:a16="http://schemas.microsoft.com/office/drawing/2014/main" id="{A59A037A-0AAA-7944-1B90-3246DF4AF562}"/>
+                </a:ext>
+              </a:extLst>
+            </p:cNvPr>
+            <p:cNvCxnSpPr/>
+            <p:nvPr/>
+          </p:nvCxnSpPr>
+          <p:spPr bwMode="auto">
+            <a:xfrm flipV="1">
+              <a:off x="6123059" y="2011926"/>
+              <a:ext cx="883566" cy="1"/>
+            </a:xfrm>
+            <a:prstGeom prst="straightConnector1">
+              <a:avLst/>
+            </a:prstGeom>
             <a:solidFill>
-              <a:schemeClr val="tx1"/>
+              <a:schemeClr val="accent1"/>
             </a:solidFill>
-          </a:ln>
-        </p:spPr>
-        <p:txBody>
-          <a:bodyPr wrap="square" rtlCol="0" anchor="ctr" anchorCtr="0">
-            <a:noAutofit/>
-          </a:bodyPr>
-          <a:lstStyle>
-            <a:defPPr>
-              <a:defRPr lang="de-DE"/>
-            </a:defPPr>
-            <a:lvl1pPr algn="ctr">
-              <a:defRPr sz="1200">
-                <a:latin typeface="Arial" panose="020B0604020202020204" pitchFamily="34" charset="0"/>
-                <a:cs typeface="Arial" panose="020B0604020202020204" pitchFamily="34" charset="0"/>
-              </a:defRPr>
-            </a:lvl1pPr>
-          </a:lstStyle>
-          <a:p>
-            <a:r>
-              <a:rPr lang="en-US" dirty="0"/>
-              <a:t>19,419 septic ICU</a:t>
-            </a:r>
-            <a:br>
-              <a:rPr lang="en-US" dirty="0"/>
-            </a:br>
-            <a:r>
-              <a:rPr lang="en-US" dirty="0"/>
-              <a:t>stays in MIMIC-IV</a:t>
-            </a:r>
-          </a:p>
-        </p:txBody>
-      </p:sp>
-      <p:cxnSp>
-        <p:nvCxnSpPr>
-          <p:cNvPr id="49" name="Straight Arrow Connector 48">
-            <a:extLst>
-              <a:ext uri="{FF2B5EF4-FFF2-40B4-BE49-F238E27FC236}">
-                <a16:creationId xmlns:a16="http://schemas.microsoft.com/office/drawing/2014/main" id="{D760F04E-81FF-2BB1-7BB5-961D1B5A2D32}"/>
-              </a:ext>
-            </a:extLst>
-          </p:cNvPr>
-          <p:cNvCxnSpPr>
-            <a:cxnSpLocks/>
-            <a:endCxn id="9" idx="3"/>
-          </p:cNvCxnSpPr>
-          <p:nvPr/>
-        </p:nvCxnSpPr>
-        <p:spPr bwMode="auto">
-          <a:xfrm flipH="1">
-            <a:off x="3976301" y="3899346"/>
-            <a:ext cx="1285513" cy="0"/>
-          </a:xfrm>
-          <a:prstGeom prst="straightConnector1">
-            <a:avLst/>
-          </a:prstGeom>
-          <a:solidFill>
-            <a:schemeClr val="accent1"/>
-          </a:solidFill>
-          <a:ln w="9525" cap="flat" cmpd="sng" algn="ctr">
+            <a:ln w="9525" cap="flat" cmpd="sng" algn="ctr">
+              <a:solidFill>
+                <a:schemeClr val="tx1"/>
+              </a:solidFill>
+              <a:prstDash val="solid"/>
+              <a:round/>
+              <a:headEnd type="none" w="med" len="med"/>
+              <a:tailEnd type="triangle"/>
+            </a:ln>
+            <a:effectLst/>
+          </p:spPr>
+        </p:cxnSp>
+        <p:cxnSp>
+          <p:nvCxnSpPr>
+            <p:cNvPr id="20" name="Straight Arrow Connector 19">
+              <a:extLst>
+                <a:ext uri="{FF2B5EF4-FFF2-40B4-BE49-F238E27FC236}">
+                  <a16:creationId xmlns:a16="http://schemas.microsoft.com/office/drawing/2014/main" id="{C7CE15E0-D39B-E7D9-A921-88805480F965}"/>
+                </a:ext>
+              </a:extLst>
+            </p:cNvPr>
+            <p:cNvCxnSpPr/>
+            <p:nvPr/>
+          </p:nvCxnSpPr>
+          <p:spPr bwMode="auto">
+            <a:xfrm flipV="1">
+              <a:off x="6123059" y="3252060"/>
+              <a:ext cx="883566" cy="1"/>
+            </a:xfrm>
+            <a:prstGeom prst="straightConnector1">
+              <a:avLst/>
+            </a:prstGeom>
             <a:solidFill>
-              <a:schemeClr val="tx1"/>
+              <a:schemeClr val="accent1"/>
             </a:solidFill>
-            <a:prstDash val="solid"/>
-            <a:round/>
-            <a:headEnd type="none" w="med" len="med"/>
-            <a:tailEnd type="triangle"/>
-          </a:ln>
-          <a:effectLst/>
-        </p:spPr>
-      </p:cxnSp>
-      <p:sp>
-        <p:nvSpPr>
-          <p:cNvPr id="3" name="Textfeld 7">
-            <a:extLst>
-              <a:ext uri="{FF2B5EF4-FFF2-40B4-BE49-F238E27FC236}">
-                <a16:creationId xmlns:a16="http://schemas.microsoft.com/office/drawing/2014/main" id="{BFD17D97-DB1D-F584-7E11-C18A8EC746A2}"/>
-              </a:ext>
-            </a:extLst>
-          </p:cNvPr>
-          <p:cNvSpPr txBox="1"/>
-          <p:nvPr/>
-        </p:nvSpPr>
-        <p:spPr>
-          <a:xfrm>
-            <a:off x="4396207" y="4184843"/>
-            <a:ext cx="1723297" cy="644709"/>
-          </a:xfrm>
-          <a:prstGeom prst="rect">
-            <a:avLst/>
-          </a:prstGeom>
-          <a:noFill/>
-          <a:ln>
+            <a:ln w="9525" cap="flat" cmpd="sng" algn="ctr">
+              <a:solidFill>
+                <a:schemeClr val="tx1"/>
+              </a:solidFill>
+              <a:prstDash val="solid"/>
+              <a:round/>
+              <a:headEnd type="none" w="med" len="med"/>
+              <a:tailEnd type="triangle"/>
+            </a:ln>
+            <a:effectLst/>
+          </p:spPr>
+        </p:cxnSp>
+        <p:sp>
+          <p:nvSpPr>
+            <p:cNvPr id="21" name="Textfeld 10">
+              <a:extLst>
+                <a:ext uri="{FF2B5EF4-FFF2-40B4-BE49-F238E27FC236}">
+                  <a16:creationId xmlns:a16="http://schemas.microsoft.com/office/drawing/2014/main" id="{8A61DAB1-38B3-2C23-4F93-3B0402FC8A12}"/>
+                </a:ext>
+              </a:extLst>
+            </p:cNvPr>
+            <p:cNvSpPr txBox="1"/>
+            <p:nvPr/>
+          </p:nvSpPr>
+          <p:spPr>
+            <a:xfrm>
+              <a:off x="7010180" y="2749093"/>
+              <a:ext cx="4365749" cy="1046440"/>
+            </a:xfrm>
+            <a:prstGeom prst="rect">
+              <a:avLst/>
+            </a:prstGeom>
             <a:solidFill>
-              <a:schemeClr val="tx1"/>
+              <a:schemeClr val="bg2">
+                <a:lumMod val="40000"/>
+                <a:lumOff val="60000"/>
+              </a:schemeClr>
             </a:solidFill>
-          </a:ln>
-        </p:spPr>
-        <p:txBody>
-          <a:bodyPr wrap="square" rtlCol="0" anchor="ctr" anchorCtr="0">
-            <a:noAutofit/>
-          </a:bodyPr>
-          <a:lstStyle>
-            <a:defPPr>
-              <a:defRPr lang="de-DE"/>
-            </a:defPPr>
-            <a:lvl1pPr algn="ctr">
-              <a:defRPr sz="1200">
-                <a:latin typeface="Arial" panose="020B0604020202020204" pitchFamily="34" charset="0"/>
-                <a:cs typeface="Arial" panose="020B0604020202020204" pitchFamily="34" charset="0"/>
-              </a:defRPr>
-            </a:lvl1pPr>
-          </a:lstStyle>
-          <a:p>
-            <a:r>
-              <a:rPr lang="en-US" dirty="0"/>
-              <a:t>23,401</a:t>
-            </a:r>
-            <a:r>
-              <a:rPr lang="en-US" b="1" dirty="0"/>
-              <a:t> </a:t>
-            </a:r>
-            <a:r>
-              <a:rPr lang="en-US" dirty="0"/>
-              <a:t>septic ICU</a:t>
-            </a:r>
-            <a:br>
-              <a:rPr lang="en-US" dirty="0"/>
-            </a:br>
-            <a:r>
-              <a:rPr lang="en-US" dirty="0"/>
-              <a:t>stays in MIMIC-IV</a:t>
-            </a:r>
-          </a:p>
-        </p:txBody>
-      </p:sp>
-      <p:cxnSp>
-        <p:nvCxnSpPr>
-          <p:cNvPr id="5" name="Straight Arrow Connector 4">
-            <a:extLst>
-              <a:ext uri="{FF2B5EF4-FFF2-40B4-BE49-F238E27FC236}">
-                <a16:creationId xmlns:a16="http://schemas.microsoft.com/office/drawing/2014/main" id="{A4F110D5-B71D-DDC5-DECD-D605B2F658C7}"/>
-              </a:ext>
-            </a:extLst>
-          </p:cNvPr>
-          <p:cNvCxnSpPr>
-            <a:stCxn id="36" idx="2"/>
-            <a:endCxn id="3" idx="0"/>
-          </p:cNvCxnSpPr>
-          <p:nvPr/>
-        </p:nvCxnSpPr>
-        <p:spPr bwMode="auto">
-          <a:xfrm>
-            <a:off x="5257856" y="3561311"/>
-            <a:ext cx="0" cy="623532"/>
-          </a:xfrm>
-          <a:prstGeom prst="straightConnector1">
-            <a:avLst/>
-          </a:prstGeom>
-          <a:solidFill>
-            <a:schemeClr val="accent1"/>
-          </a:solidFill>
-          <a:ln w="9525" cap="flat" cmpd="sng" algn="ctr">
+            <a:ln>
+              <a:solidFill>
+                <a:schemeClr val="tx1"/>
+              </a:solidFill>
+            </a:ln>
+          </p:spPr>
+          <p:txBody>
+            <a:bodyPr wrap="square" rtlCol="0" anchor="ctr" anchorCtr="0">
+              <a:spAutoFit/>
+            </a:bodyPr>
+            <a:lstStyle/>
+            <a:p>
+              <a:r>
+                <a:rPr lang="en-US" sz="1200" dirty="0">
+                  <a:latin typeface="Arial" panose="020B0604020202020204" pitchFamily="34" charset="0"/>
+                  <a:cs typeface="Arial" panose="020B0604020202020204" pitchFamily="34" charset="0"/>
+                </a:rPr>
+                <a:t>Cohort composition:</a:t>
+              </a:r>
+            </a:p>
+            <a:p>
+              <a:r>
+                <a:rPr lang="en-US" sz="1200" dirty="0">
+                  <a:latin typeface="Arial" panose="020B0604020202020204" pitchFamily="34" charset="0"/>
+                  <a:cs typeface="Arial" panose="020B0604020202020204" pitchFamily="34" charset="0"/>
+                </a:rPr>
+                <a:t>Race: Black 10.0%, White 68.3%, Asian 2.9%, Hispanic 3.7%</a:t>
+              </a:r>
+            </a:p>
+            <a:p>
+              <a:r>
+                <a:rPr lang="en-US" sz="1200" dirty="0">
+                  <a:latin typeface="Arial" panose="020B0604020202020204" pitchFamily="34" charset="0"/>
+                  <a:cs typeface="Arial" panose="020B0604020202020204" pitchFamily="34" charset="0"/>
+                </a:rPr>
+                <a:t>Sex: Male 58.1%, Female 41.9%</a:t>
+              </a:r>
+            </a:p>
+            <a:p>
+              <a:r>
+                <a:rPr lang="en-US" sz="1200" dirty="0">
+                  <a:latin typeface="Arial" panose="020B0604020202020204" pitchFamily="34" charset="0"/>
+                  <a:cs typeface="Arial" panose="020B0604020202020204" pitchFamily="34" charset="0"/>
+                </a:rPr>
+                <a:t>Limited English Proficiency: 10.6%</a:t>
+              </a:r>
+            </a:p>
+            <a:p>
+              <a:r>
+                <a:rPr lang="en-US" sz="1200" dirty="0">
+                  <a:latin typeface="Arial" panose="020B0604020202020204" pitchFamily="34" charset="0"/>
+                  <a:cs typeface="Arial" panose="020B0604020202020204" pitchFamily="34" charset="0"/>
+                </a:rPr>
+                <a:t>Insurance: Medicare/Medicaid 56.1%, Other: 43.9%</a:t>
+              </a:r>
+            </a:p>
+          </p:txBody>
+        </p:sp>
+        <p:sp>
+          <p:nvSpPr>
+            <p:cNvPr id="22" name="Textfeld 10">
+              <a:extLst>
+                <a:ext uri="{FF2B5EF4-FFF2-40B4-BE49-F238E27FC236}">
+                  <a16:creationId xmlns:a16="http://schemas.microsoft.com/office/drawing/2014/main" id="{61DC2FF8-BB1B-D4DA-536C-4AD9E8004F6D}"/>
+                </a:ext>
+              </a:extLst>
+            </p:cNvPr>
+            <p:cNvSpPr txBox="1"/>
+            <p:nvPr/>
+          </p:nvSpPr>
+          <p:spPr>
+            <a:xfrm>
+              <a:off x="7010180" y="4004615"/>
+              <a:ext cx="4365749" cy="1015663"/>
+            </a:xfrm>
+            <a:prstGeom prst="rect">
+              <a:avLst/>
+            </a:prstGeom>
             <a:solidFill>
-              <a:schemeClr val="tx1"/>
+              <a:schemeClr val="bg2">
+                <a:lumMod val="40000"/>
+                <a:lumOff val="60000"/>
+              </a:schemeClr>
             </a:solidFill>
-            <a:prstDash val="solid"/>
-            <a:round/>
-            <a:headEnd type="none" w="med" len="med"/>
-            <a:tailEnd type="triangle"/>
-          </a:ln>
-          <a:effectLst/>
-        </p:spPr>
-      </p:cxnSp>
-      <p:sp>
-        <p:nvSpPr>
-          <p:cNvPr id="12" name="Textfeld 10">
-            <a:extLst>
-              <a:ext uri="{FF2B5EF4-FFF2-40B4-BE49-F238E27FC236}">
-                <a16:creationId xmlns:a16="http://schemas.microsoft.com/office/drawing/2014/main" id="{9803919A-D35D-6474-2286-6581CD2C024B}"/>
-              </a:ext>
-            </a:extLst>
-          </p:cNvPr>
-          <p:cNvSpPr txBox="1"/>
-          <p:nvPr/>
-        </p:nvSpPr>
-        <p:spPr>
-          <a:xfrm>
-            <a:off x="1420301" y="4867219"/>
-            <a:ext cx="2556000" cy="461665"/>
-          </a:xfrm>
-          <a:prstGeom prst="rect">
-            <a:avLst/>
-          </a:prstGeom>
-          <a:noFill/>
-          <a:ln>
+            <a:ln>
+              <a:solidFill>
+                <a:schemeClr val="tx1"/>
+              </a:solidFill>
+            </a:ln>
+          </p:spPr>
+          <p:txBody>
+            <a:bodyPr wrap="square" rtlCol="0" anchor="ctr" anchorCtr="0">
+              <a:spAutoFit/>
+            </a:bodyPr>
+            <a:lstStyle/>
+            <a:p>
+              <a:r>
+                <a:rPr lang="en-US" sz="1200" dirty="0">
+                  <a:latin typeface="Arial" panose="020B0604020202020204" pitchFamily="34" charset="0"/>
+                  <a:cs typeface="Arial" panose="020B0604020202020204" pitchFamily="34" charset="0"/>
+                </a:rPr>
+                <a:t>Cohort composition:</a:t>
+              </a:r>
+            </a:p>
+            <a:p>
+              <a:r>
+                <a:rPr lang="en-US" sz="1200" dirty="0">
+                  <a:latin typeface="Arial" panose="020B0604020202020204" pitchFamily="34" charset="0"/>
+                  <a:cs typeface="Arial" panose="020B0604020202020204" pitchFamily="34" charset="0"/>
+                </a:rPr>
+                <a:t>Race: Black 8.7%, White 68.0%, Asian 2.8%, Hispanic 3.5%</a:t>
+              </a:r>
+            </a:p>
+            <a:p>
+              <a:r>
+                <a:rPr lang="en-US" sz="1200" dirty="0">
+                  <a:latin typeface="Arial" panose="020B0604020202020204" pitchFamily="34" charset="0"/>
+                  <a:cs typeface="Arial" panose="020B0604020202020204" pitchFamily="34" charset="0"/>
+                </a:rPr>
+                <a:t>Sex: Male 58.0%, Female 42.0%</a:t>
+              </a:r>
+            </a:p>
+            <a:p>
+              <a:r>
+                <a:rPr lang="en-US" sz="1200" dirty="0">
+                  <a:latin typeface="Arial" panose="020B0604020202020204" pitchFamily="34" charset="0"/>
+                  <a:cs typeface="Arial" panose="020B0604020202020204" pitchFamily="34" charset="0"/>
+                </a:rPr>
+                <a:t>Limited English Proficiency: 10.4%</a:t>
+              </a:r>
+            </a:p>
+            <a:p>
+              <a:r>
+                <a:rPr lang="en-US" sz="1200" dirty="0">
+                  <a:latin typeface="Arial" panose="020B0604020202020204" pitchFamily="34" charset="0"/>
+                  <a:cs typeface="Arial" panose="020B0604020202020204" pitchFamily="34" charset="0"/>
+                </a:rPr>
+                <a:t>Insurance: Medicare/Medicaid 54.2%, Other 45.8%</a:t>
+              </a:r>
+            </a:p>
+          </p:txBody>
+        </p:sp>
+        <p:sp>
+          <p:nvSpPr>
+            <p:cNvPr id="23" name="Textfeld 10">
+              <a:extLst>
+                <a:ext uri="{FF2B5EF4-FFF2-40B4-BE49-F238E27FC236}">
+                  <a16:creationId xmlns:a16="http://schemas.microsoft.com/office/drawing/2014/main" id="{42FEEBC9-D4B6-0CFD-96E9-F119E539D00A}"/>
+                </a:ext>
+              </a:extLst>
+            </p:cNvPr>
+            <p:cNvSpPr txBox="1"/>
+            <p:nvPr/>
+          </p:nvSpPr>
+          <p:spPr>
+            <a:xfrm>
+              <a:off x="7010180" y="5278193"/>
+              <a:ext cx="4365749" cy="1015663"/>
+            </a:xfrm>
+            <a:prstGeom prst="rect">
+              <a:avLst/>
+            </a:prstGeom>
             <a:solidFill>
-              <a:schemeClr val="tx1"/>
+              <a:schemeClr val="bg2">
+                <a:lumMod val="40000"/>
+                <a:lumOff val="60000"/>
+              </a:schemeClr>
             </a:solidFill>
-          </a:ln>
-        </p:spPr>
-        <p:txBody>
-          <a:bodyPr wrap="square" rtlCol="0" anchor="ctr" anchorCtr="0">
-            <a:spAutoFit/>
-          </a:bodyPr>
-          <a:lstStyle/>
-          <a:p>
-            <a:r>
-              <a:rPr lang="en-US" sz="1200" dirty="0">
-                <a:latin typeface="Arial" panose="020B0604020202020204" pitchFamily="34" charset="0"/>
-                <a:cs typeface="Arial" panose="020B0604020202020204" pitchFamily="34" charset="0"/>
-              </a:rPr>
-              <a:t>Excluded: Stays with race unknown or other (n= 3,982)</a:t>
-            </a:r>
-          </a:p>
-        </p:txBody>
-      </p:sp>
-      <p:cxnSp>
-        <p:nvCxnSpPr>
-          <p:cNvPr id="13" name="Straight Arrow Connector 12">
-            <a:extLst>
-              <a:ext uri="{FF2B5EF4-FFF2-40B4-BE49-F238E27FC236}">
-                <a16:creationId xmlns:a16="http://schemas.microsoft.com/office/drawing/2014/main" id="{33A292FB-99CA-9674-D2DF-D5924A981FA7}"/>
-              </a:ext>
-            </a:extLst>
-          </p:cNvPr>
-          <p:cNvCxnSpPr>
-            <a:cxnSpLocks/>
-            <a:endCxn id="12" idx="3"/>
-          </p:cNvCxnSpPr>
-          <p:nvPr/>
-        </p:nvCxnSpPr>
-        <p:spPr bwMode="auto">
-          <a:xfrm flipH="1" flipV="1">
-            <a:off x="3976301" y="5098052"/>
-            <a:ext cx="1289005" cy="2340"/>
-          </a:xfrm>
-          <a:prstGeom prst="straightConnector1">
-            <a:avLst/>
-          </a:prstGeom>
-          <a:solidFill>
-            <a:schemeClr val="accent1"/>
-          </a:solidFill>
-          <a:ln w="9525" cap="flat" cmpd="sng" algn="ctr">
+            <a:ln>
+              <a:solidFill>
+                <a:schemeClr val="tx1"/>
+              </a:solidFill>
+            </a:ln>
+          </p:spPr>
+          <p:txBody>
+            <a:bodyPr wrap="square" rtlCol="0" anchor="ctr" anchorCtr="0">
+              <a:spAutoFit/>
+            </a:bodyPr>
+            <a:lstStyle/>
+            <a:p>
+              <a:r>
+                <a:rPr lang="en-US" sz="1200" dirty="0">
+                  <a:latin typeface="Arial" panose="020B0604020202020204" pitchFamily="34" charset="0"/>
+                  <a:cs typeface="Arial" panose="020B0604020202020204" pitchFamily="34" charset="0"/>
+                </a:rPr>
+                <a:t>Cohort composition:</a:t>
+              </a:r>
+            </a:p>
+            <a:p>
+              <a:r>
+                <a:rPr lang="en-US" sz="1200" dirty="0">
+                  <a:latin typeface="Arial" panose="020B0604020202020204" pitchFamily="34" charset="0"/>
+                  <a:cs typeface="Arial" panose="020B0604020202020204" pitchFamily="34" charset="0"/>
+                </a:rPr>
+                <a:t>Race: Black 10.4%, White 82.0%, Asian 3.4%, Hispanic 4.2%</a:t>
+              </a:r>
+            </a:p>
+            <a:p>
+              <a:r>
+                <a:rPr lang="en-US" sz="1200" dirty="0">
+                  <a:latin typeface="Arial" panose="020B0604020202020204" pitchFamily="34" charset="0"/>
+                  <a:cs typeface="Arial" panose="020B0604020202020204" pitchFamily="34" charset="0"/>
+                </a:rPr>
+                <a:t>Sex: Male 57.4%, Female 42.6%</a:t>
+              </a:r>
+            </a:p>
+            <a:p>
+              <a:r>
+                <a:rPr lang="en-US" sz="1200" dirty="0">
+                  <a:latin typeface="Arial" panose="020B0604020202020204" pitchFamily="34" charset="0"/>
+                  <a:cs typeface="Arial" panose="020B0604020202020204" pitchFamily="34" charset="0"/>
+                </a:rPr>
+                <a:t>Limited English Proficiency: 9.7%</a:t>
+              </a:r>
+            </a:p>
+            <a:p>
+              <a:r>
+                <a:rPr lang="en-US" sz="1200" dirty="0">
+                  <a:latin typeface="Arial" panose="020B0604020202020204" pitchFamily="34" charset="0"/>
+                  <a:cs typeface="Arial" panose="020B0604020202020204" pitchFamily="34" charset="0"/>
+                </a:rPr>
+                <a:t>Insurance: Medicare/Medicaid 55.2%, Other 44.8%</a:t>
+              </a:r>
+            </a:p>
+          </p:txBody>
+        </p:sp>
+        <p:cxnSp>
+          <p:nvCxnSpPr>
+            <p:cNvPr id="24" name="Straight Arrow Connector 23">
+              <a:extLst>
+                <a:ext uri="{FF2B5EF4-FFF2-40B4-BE49-F238E27FC236}">
+                  <a16:creationId xmlns:a16="http://schemas.microsoft.com/office/drawing/2014/main" id="{59F3F1E3-C3E3-64A8-0F2C-8C939A1C9948}"/>
+                </a:ext>
+              </a:extLst>
+            </p:cNvPr>
+            <p:cNvCxnSpPr/>
+            <p:nvPr/>
+          </p:nvCxnSpPr>
+          <p:spPr bwMode="auto">
+            <a:xfrm>
+              <a:off x="5272756" y="4829552"/>
+              <a:ext cx="0" cy="623532"/>
+            </a:xfrm>
+            <a:prstGeom prst="straightConnector1">
+              <a:avLst/>
+            </a:prstGeom>
             <a:solidFill>
-              <a:schemeClr val="tx1"/>
+              <a:schemeClr val="accent1"/>
             </a:solidFill>
-            <a:prstDash val="solid"/>
-            <a:round/>
-            <a:headEnd type="none" w="med" len="med"/>
-            <a:tailEnd type="triangle"/>
-          </a:ln>
-          <a:effectLst/>
-        </p:spPr>
-      </p:cxnSp>
-      <p:cxnSp>
-        <p:nvCxnSpPr>
-          <p:cNvPr id="16" name="Straight Arrow Connector 15">
-            <a:extLst>
-              <a:ext uri="{FF2B5EF4-FFF2-40B4-BE49-F238E27FC236}">
-                <a16:creationId xmlns:a16="http://schemas.microsoft.com/office/drawing/2014/main" id="{ECB7953F-D68A-439F-D8CD-D3A62EF6D192}"/>
-              </a:ext>
-            </a:extLst>
-          </p:cNvPr>
-          <p:cNvCxnSpPr>
-            <a:cxnSpLocks/>
-            <a:stCxn id="3" idx="3"/>
-          </p:cNvCxnSpPr>
-          <p:nvPr/>
-        </p:nvCxnSpPr>
-        <p:spPr bwMode="auto">
-          <a:xfrm flipV="1">
-            <a:off x="6119504" y="4507197"/>
-            <a:ext cx="883566" cy="1"/>
-          </a:xfrm>
-          <a:prstGeom prst="straightConnector1">
-            <a:avLst/>
-          </a:prstGeom>
-          <a:solidFill>
-            <a:schemeClr val="accent1"/>
-          </a:solidFill>
-          <a:ln w="9525" cap="flat" cmpd="sng" algn="ctr">
-            <a:solidFill>
-              <a:schemeClr val="tx1"/>
-            </a:solidFill>
-            <a:prstDash val="solid"/>
-            <a:round/>
-            <a:headEnd type="none" w="med" len="med"/>
-            <a:tailEnd type="triangle"/>
-          </a:ln>
-          <a:effectLst/>
-        </p:spPr>
-      </p:cxnSp>
-      <p:cxnSp>
-        <p:nvCxnSpPr>
-          <p:cNvPr id="19" name="Straight Arrow Connector 18">
-            <a:extLst>
-              <a:ext uri="{FF2B5EF4-FFF2-40B4-BE49-F238E27FC236}">
-                <a16:creationId xmlns:a16="http://schemas.microsoft.com/office/drawing/2014/main" id="{3D045019-133A-68E3-26F9-A8B41D5D70D3}"/>
-              </a:ext>
-            </a:extLst>
-          </p:cNvPr>
-          <p:cNvCxnSpPr>
-            <a:cxnSpLocks/>
-          </p:cNvCxnSpPr>
-          <p:nvPr/>
-        </p:nvCxnSpPr>
-        <p:spPr bwMode="auto">
-          <a:xfrm flipV="1">
-            <a:off x="6119504" y="5803737"/>
-            <a:ext cx="883566" cy="1"/>
-          </a:xfrm>
-          <a:prstGeom prst="straightConnector1">
-            <a:avLst/>
-          </a:prstGeom>
-          <a:solidFill>
-            <a:schemeClr val="accent1"/>
-          </a:solidFill>
-          <a:ln w="9525" cap="flat" cmpd="sng" algn="ctr">
-            <a:solidFill>
-              <a:schemeClr val="tx1"/>
-            </a:solidFill>
-            <a:prstDash val="solid"/>
-            <a:round/>
-            <a:headEnd type="none" w="med" len="med"/>
-            <a:tailEnd type="triangle"/>
-          </a:ln>
-          <a:effectLst/>
-        </p:spPr>
-      </p:cxnSp>
-      <p:sp>
-        <p:nvSpPr>
-          <p:cNvPr id="6" name="Textfeld 10">
-            <a:extLst>
-              <a:ext uri="{FF2B5EF4-FFF2-40B4-BE49-F238E27FC236}">
-                <a16:creationId xmlns:a16="http://schemas.microsoft.com/office/drawing/2014/main" id="{5F77A8F6-B0C3-9DDA-CB0B-F91D629A1EB5}"/>
-              </a:ext>
-            </a:extLst>
-          </p:cNvPr>
-          <p:cNvSpPr txBox="1"/>
-          <p:nvPr/>
-        </p:nvSpPr>
-        <p:spPr>
-          <a:xfrm>
-            <a:off x="7006624" y="1504094"/>
-            <a:ext cx="4365749" cy="1015663"/>
-          </a:xfrm>
-          <a:prstGeom prst="rect">
-            <a:avLst/>
-          </a:prstGeom>
-          <a:solidFill>
-            <a:schemeClr val="bg2">
-              <a:lumMod val="40000"/>
-              <a:lumOff val="60000"/>
-            </a:schemeClr>
-          </a:solidFill>
-          <a:ln>
-            <a:solidFill>
-              <a:schemeClr val="tx1"/>
-            </a:solidFill>
-          </a:ln>
-        </p:spPr>
-        <p:txBody>
-          <a:bodyPr wrap="square" rtlCol="0" anchor="ctr" anchorCtr="0">
-            <a:spAutoFit/>
-          </a:bodyPr>
-          <a:lstStyle/>
-          <a:p>
-            <a:r>
-              <a:rPr lang="en-US" sz="1200" dirty="0">
-                <a:latin typeface="Arial" panose="020B0604020202020204" pitchFamily="34" charset="0"/>
-                <a:cs typeface="Arial" panose="020B0604020202020204" pitchFamily="34" charset="0"/>
-              </a:rPr>
-              <a:t>Cohort composition:</a:t>
-            </a:r>
-          </a:p>
-          <a:p>
-            <a:r>
-              <a:rPr lang="en-US" sz="1200" dirty="0">
-                <a:latin typeface="Arial" panose="020B0604020202020204" pitchFamily="34" charset="0"/>
-                <a:cs typeface="Arial" panose="020B0604020202020204" pitchFamily="34" charset="0"/>
-              </a:rPr>
-              <a:t>Race: Black 10.2%, White 68.2%, Asian 2.9%, Hispanic 3.7%</a:t>
-            </a:r>
-          </a:p>
-          <a:p>
-            <a:r>
-              <a:rPr lang="en-US" sz="1200" dirty="0">
-                <a:latin typeface="Arial" panose="020B0604020202020204" pitchFamily="34" charset="0"/>
-                <a:cs typeface="Arial" panose="020B0604020202020204" pitchFamily="34" charset="0"/>
-              </a:rPr>
-              <a:t>Sex: Male 57.8%, Female 42.2%</a:t>
-            </a:r>
-          </a:p>
-          <a:p>
-            <a:r>
-              <a:rPr lang="en-US" sz="1200" dirty="0">
-                <a:latin typeface="Arial" panose="020B0604020202020204" pitchFamily="34" charset="0"/>
-                <a:cs typeface="Arial" panose="020B0604020202020204" pitchFamily="34" charset="0"/>
-              </a:rPr>
-              <a:t>Limited English Proficiency: 10.8%</a:t>
-            </a:r>
-          </a:p>
-          <a:p>
-            <a:r>
-              <a:rPr lang="en-US" sz="1200" dirty="0">
-                <a:latin typeface="Arial" panose="020B0604020202020204" pitchFamily="34" charset="0"/>
-                <a:cs typeface="Arial" panose="020B0604020202020204" pitchFamily="34" charset="0"/>
-              </a:rPr>
-              <a:t>Insurance: Medicare/Medicaid 56.3%, Other: 43.7%</a:t>
-            </a:r>
-          </a:p>
-        </p:txBody>
-      </p:sp>
-      <p:cxnSp>
-        <p:nvCxnSpPr>
-          <p:cNvPr id="8" name="Straight Arrow Connector 7">
-            <a:extLst>
-              <a:ext uri="{FF2B5EF4-FFF2-40B4-BE49-F238E27FC236}">
-                <a16:creationId xmlns:a16="http://schemas.microsoft.com/office/drawing/2014/main" id="{A59A037A-0AAA-7944-1B90-3246DF4AF562}"/>
-              </a:ext>
-            </a:extLst>
-          </p:cNvPr>
-          <p:cNvCxnSpPr/>
-          <p:nvPr/>
-        </p:nvCxnSpPr>
-        <p:spPr bwMode="auto">
-          <a:xfrm flipV="1">
-            <a:off x="6123059" y="2011926"/>
-            <a:ext cx="883566" cy="1"/>
-          </a:xfrm>
-          <a:prstGeom prst="straightConnector1">
-            <a:avLst/>
-          </a:prstGeom>
-          <a:solidFill>
-            <a:schemeClr val="accent1"/>
-          </a:solidFill>
-          <a:ln w="9525" cap="flat" cmpd="sng" algn="ctr">
-            <a:solidFill>
-              <a:schemeClr val="tx1"/>
-            </a:solidFill>
-            <a:prstDash val="solid"/>
-            <a:round/>
-            <a:headEnd type="none" w="med" len="med"/>
-            <a:tailEnd type="triangle"/>
-          </a:ln>
-          <a:effectLst/>
-        </p:spPr>
-      </p:cxnSp>
-      <p:cxnSp>
-        <p:nvCxnSpPr>
-          <p:cNvPr id="20" name="Straight Arrow Connector 19">
-            <a:extLst>
-              <a:ext uri="{FF2B5EF4-FFF2-40B4-BE49-F238E27FC236}">
-                <a16:creationId xmlns:a16="http://schemas.microsoft.com/office/drawing/2014/main" id="{C7CE15E0-D39B-E7D9-A921-88805480F965}"/>
-              </a:ext>
-            </a:extLst>
-          </p:cNvPr>
-          <p:cNvCxnSpPr/>
-          <p:nvPr/>
-        </p:nvCxnSpPr>
-        <p:spPr bwMode="auto">
-          <a:xfrm flipV="1">
-            <a:off x="6123059" y="3252060"/>
-            <a:ext cx="883566" cy="1"/>
-          </a:xfrm>
-          <a:prstGeom prst="straightConnector1">
-            <a:avLst/>
-          </a:prstGeom>
-          <a:solidFill>
-            <a:schemeClr val="accent1"/>
-          </a:solidFill>
-          <a:ln w="9525" cap="flat" cmpd="sng" algn="ctr">
-            <a:solidFill>
-              <a:schemeClr val="tx1"/>
-            </a:solidFill>
-            <a:prstDash val="solid"/>
-            <a:round/>
-            <a:headEnd type="none" w="med" len="med"/>
-            <a:tailEnd type="triangle"/>
-          </a:ln>
-          <a:effectLst/>
-        </p:spPr>
-      </p:cxnSp>
-      <p:sp>
-        <p:nvSpPr>
-          <p:cNvPr id="21" name="Textfeld 10">
-            <a:extLst>
-              <a:ext uri="{FF2B5EF4-FFF2-40B4-BE49-F238E27FC236}">
-                <a16:creationId xmlns:a16="http://schemas.microsoft.com/office/drawing/2014/main" id="{8A61DAB1-38B3-2C23-4F93-3B0402FC8A12}"/>
-              </a:ext>
-            </a:extLst>
-          </p:cNvPr>
-          <p:cNvSpPr txBox="1"/>
-          <p:nvPr/>
-        </p:nvSpPr>
-        <p:spPr>
-          <a:xfrm>
-            <a:off x="7010180" y="2749093"/>
-            <a:ext cx="4365749" cy="1046440"/>
-          </a:xfrm>
-          <a:prstGeom prst="rect">
-            <a:avLst/>
-          </a:prstGeom>
-          <a:solidFill>
-            <a:schemeClr val="bg2">
-              <a:lumMod val="40000"/>
-              <a:lumOff val="60000"/>
-            </a:schemeClr>
-          </a:solidFill>
-          <a:ln>
-            <a:solidFill>
-              <a:schemeClr val="tx1"/>
-            </a:solidFill>
-          </a:ln>
-        </p:spPr>
-        <p:txBody>
-          <a:bodyPr wrap="square" rtlCol="0" anchor="ctr" anchorCtr="0">
-            <a:spAutoFit/>
-          </a:bodyPr>
-          <a:lstStyle/>
-          <a:p>
-            <a:r>
-              <a:rPr lang="en-US" sz="1200" dirty="0">
-                <a:latin typeface="Arial" panose="020B0604020202020204" pitchFamily="34" charset="0"/>
-                <a:cs typeface="Arial" panose="020B0604020202020204" pitchFamily="34" charset="0"/>
-              </a:rPr>
-              <a:t>Cohort composition:</a:t>
-            </a:r>
-          </a:p>
-          <a:p>
-            <a:r>
-              <a:rPr lang="en-US" sz="1200" dirty="0">
-                <a:latin typeface="Arial" panose="020B0604020202020204" pitchFamily="34" charset="0"/>
-                <a:cs typeface="Arial" panose="020B0604020202020204" pitchFamily="34" charset="0"/>
-              </a:rPr>
-              <a:t>Race: Black 10.0%, White 68.3%, Asian 2.9%, Hispanic 3.7%</a:t>
-            </a:r>
-          </a:p>
-          <a:p>
-            <a:r>
-              <a:rPr lang="en-US" sz="1200" dirty="0">
-                <a:latin typeface="Arial" panose="020B0604020202020204" pitchFamily="34" charset="0"/>
-                <a:cs typeface="Arial" panose="020B0604020202020204" pitchFamily="34" charset="0"/>
-              </a:rPr>
-              <a:t>Sex: Male 58.1%, Female 41.9%</a:t>
-            </a:r>
-          </a:p>
-          <a:p>
-            <a:r>
-              <a:rPr lang="en-US" sz="1200" dirty="0">
-                <a:latin typeface="Arial" panose="020B0604020202020204" pitchFamily="34" charset="0"/>
-                <a:cs typeface="Arial" panose="020B0604020202020204" pitchFamily="34" charset="0"/>
-              </a:rPr>
-              <a:t>Limited English Proficiency: 10.6%</a:t>
-            </a:r>
-          </a:p>
-          <a:p>
-            <a:r>
-              <a:rPr lang="en-US" sz="1200" dirty="0">
-                <a:latin typeface="Arial" panose="020B0604020202020204" pitchFamily="34" charset="0"/>
-                <a:cs typeface="Arial" panose="020B0604020202020204" pitchFamily="34" charset="0"/>
-              </a:rPr>
-              <a:t>Insurance: Medicare/Medicaid 56.1%, Other: 43.9%</a:t>
-            </a:r>
-          </a:p>
-        </p:txBody>
-      </p:sp>
-      <p:sp>
-        <p:nvSpPr>
-          <p:cNvPr id="22" name="Textfeld 10">
-            <a:extLst>
-              <a:ext uri="{FF2B5EF4-FFF2-40B4-BE49-F238E27FC236}">
-                <a16:creationId xmlns:a16="http://schemas.microsoft.com/office/drawing/2014/main" id="{61DC2FF8-BB1B-D4DA-536C-4AD9E8004F6D}"/>
-              </a:ext>
-            </a:extLst>
-          </p:cNvPr>
-          <p:cNvSpPr txBox="1"/>
-          <p:nvPr/>
-        </p:nvSpPr>
-        <p:spPr>
-          <a:xfrm>
-            <a:off x="7010180" y="4004615"/>
-            <a:ext cx="4365749" cy="1015663"/>
-          </a:xfrm>
-          <a:prstGeom prst="rect">
-            <a:avLst/>
-          </a:prstGeom>
-          <a:solidFill>
-            <a:schemeClr val="bg2">
-              <a:lumMod val="40000"/>
-              <a:lumOff val="60000"/>
-            </a:schemeClr>
-          </a:solidFill>
-          <a:ln>
-            <a:solidFill>
-              <a:schemeClr val="tx1"/>
-            </a:solidFill>
-          </a:ln>
-        </p:spPr>
-        <p:txBody>
-          <a:bodyPr wrap="square" rtlCol="0" anchor="ctr" anchorCtr="0">
-            <a:spAutoFit/>
-          </a:bodyPr>
-          <a:lstStyle/>
-          <a:p>
-            <a:r>
-              <a:rPr lang="en-US" sz="1200" dirty="0">
-                <a:latin typeface="Arial" panose="020B0604020202020204" pitchFamily="34" charset="0"/>
-                <a:cs typeface="Arial" panose="020B0604020202020204" pitchFamily="34" charset="0"/>
-              </a:rPr>
-              <a:t>Cohort composition:</a:t>
-            </a:r>
-          </a:p>
-          <a:p>
-            <a:r>
-              <a:rPr lang="en-US" sz="1200" dirty="0">
-                <a:latin typeface="Arial" panose="020B0604020202020204" pitchFamily="34" charset="0"/>
-                <a:cs typeface="Arial" panose="020B0604020202020204" pitchFamily="34" charset="0"/>
-              </a:rPr>
-              <a:t>Race: Black 8.7%, White 68.0%, Asian 2.8%, Hispanic 3.5%</a:t>
-            </a:r>
-          </a:p>
-          <a:p>
-            <a:r>
-              <a:rPr lang="en-US" sz="1200" dirty="0">
-                <a:latin typeface="Arial" panose="020B0604020202020204" pitchFamily="34" charset="0"/>
-                <a:cs typeface="Arial" panose="020B0604020202020204" pitchFamily="34" charset="0"/>
-              </a:rPr>
-              <a:t>Sex: Male 58.0%, Female 42.0%</a:t>
-            </a:r>
-          </a:p>
-          <a:p>
-            <a:r>
-              <a:rPr lang="en-US" sz="1200" dirty="0">
-                <a:latin typeface="Arial" panose="020B0604020202020204" pitchFamily="34" charset="0"/>
-                <a:cs typeface="Arial" panose="020B0604020202020204" pitchFamily="34" charset="0"/>
-              </a:rPr>
-              <a:t>Limited English Proficiency: 10.4%</a:t>
-            </a:r>
-          </a:p>
-          <a:p>
-            <a:r>
-              <a:rPr lang="en-US" sz="1200" dirty="0">
-                <a:latin typeface="Arial" panose="020B0604020202020204" pitchFamily="34" charset="0"/>
-                <a:cs typeface="Arial" panose="020B0604020202020204" pitchFamily="34" charset="0"/>
-              </a:rPr>
-              <a:t>Insurance: Medicare/Medicaid 54.2%, Other 45.8%</a:t>
-            </a:r>
-          </a:p>
-        </p:txBody>
-      </p:sp>
-      <p:sp>
-        <p:nvSpPr>
-          <p:cNvPr id="23" name="Textfeld 10">
-            <a:extLst>
-              <a:ext uri="{FF2B5EF4-FFF2-40B4-BE49-F238E27FC236}">
-                <a16:creationId xmlns:a16="http://schemas.microsoft.com/office/drawing/2014/main" id="{42FEEBC9-D4B6-0CFD-96E9-F119E539D00A}"/>
-              </a:ext>
-            </a:extLst>
-          </p:cNvPr>
-          <p:cNvSpPr txBox="1"/>
-          <p:nvPr/>
-        </p:nvSpPr>
-        <p:spPr>
-          <a:xfrm>
-            <a:off x="7010180" y="5278193"/>
-            <a:ext cx="4365749" cy="1015663"/>
-          </a:xfrm>
-          <a:prstGeom prst="rect">
-            <a:avLst/>
-          </a:prstGeom>
-          <a:solidFill>
-            <a:schemeClr val="bg2">
-              <a:lumMod val="40000"/>
-              <a:lumOff val="60000"/>
-            </a:schemeClr>
-          </a:solidFill>
-          <a:ln>
-            <a:solidFill>
-              <a:schemeClr val="tx1"/>
-            </a:solidFill>
-          </a:ln>
-        </p:spPr>
-        <p:txBody>
-          <a:bodyPr wrap="square" rtlCol="0" anchor="ctr" anchorCtr="0">
-            <a:spAutoFit/>
-          </a:bodyPr>
-          <a:lstStyle/>
-          <a:p>
-            <a:r>
-              <a:rPr lang="en-US" sz="1200" dirty="0">
-                <a:latin typeface="Arial" panose="020B0604020202020204" pitchFamily="34" charset="0"/>
-                <a:cs typeface="Arial" panose="020B0604020202020204" pitchFamily="34" charset="0"/>
-              </a:rPr>
-              <a:t>Cohort composition:</a:t>
-            </a:r>
-          </a:p>
-          <a:p>
-            <a:r>
-              <a:rPr lang="en-US" sz="1200" dirty="0">
-                <a:latin typeface="Arial" panose="020B0604020202020204" pitchFamily="34" charset="0"/>
-                <a:cs typeface="Arial" panose="020B0604020202020204" pitchFamily="34" charset="0"/>
-              </a:rPr>
-              <a:t>Race: Black 10.4%, White 82.0%, Asian 3.4%, Hispanic 4.2%</a:t>
-            </a:r>
-          </a:p>
-          <a:p>
-            <a:r>
-              <a:rPr lang="en-US" sz="1200" dirty="0">
-                <a:latin typeface="Arial" panose="020B0604020202020204" pitchFamily="34" charset="0"/>
-                <a:cs typeface="Arial" panose="020B0604020202020204" pitchFamily="34" charset="0"/>
-              </a:rPr>
-              <a:t>Sex: Male 57.4%, Female 42.6%</a:t>
-            </a:r>
-          </a:p>
-          <a:p>
-            <a:r>
-              <a:rPr lang="en-US" sz="1200" dirty="0">
-                <a:latin typeface="Arial" panose="020B0604020202020204" pitchFamily="34" charset="0"/>
-                <a:cs typeface="Arial" panose="020B0604020202020204" pitchFamily="34" charset="0"/>
-              </a:rPr>
-              <a:t>Limited English Proficiency: 9.7%</a:t>
-            </a:r>
-          </a:p>
-          <a:p>
-            <a:r>
-              <a:rPr lang="en-US" sz="1200" dirty="0">
-                <a:latin typeface="Arial" panose="020B0604020202020204" pitchFamily="34" charset="0"/>
-                <a:cs typeface="Arial" panose="020B0604020202020204" pitchFamily="34" charset="0"/>
-              </a:rPr>
-              <a:t>Insurance: Medicare/Medicaid 55.2%, Other 44.8%</a:t>
-            </a:r>
-          </a:p>
-        </p:txBody>
-      </p:sp>
-      <p:cxnSp>
-        <p:nvCxnSpPr>
-          <p:cNvPr id="24" name="Straight Arrow Connector 23">
-            <a:extLst>
-              <a:ext uri="{FF2B5EF4-FFF2-40B4-BE49-F238E27FC236}">
-                <a16:creationId xmlns:a16="http://schemas.microsoft.com/office/drawing/2014/main" id="{59F3F1E3-C3E3-64A8-0F2C-8C939A1C9948}"/>
-              </a:ext>
-            </a:extLst>
-          </p:cNvPr>
-          <p:cNvCxnSpPr/>
-          <p:nvPr/>
-        </p:nvCxnSpPr>
-        <p:spPr bwMode="auto">
-          <a:xfrm>
-            <a:off x="5272756" y="4829552"/>
-            <a:ext cx="0" cy="623532"/>
-          </a:xfrm>
-          <a:prstGeom prst="straightConnector1">
-            <a:avLst/>
-          </a:prstGeom>
-          <a:solidFill>
-            <a:schemeClr val="accent1"/>
-          </a:solidFill>
-          <a:ln w="9525" cap="flat" cmpd="sng" algn="ctr">
-            <a:solidFill>
-              <a:schemeClr val="tx1"/>
-            </a:solidFill>
-            <a:prstDash val="solid"/>
-            <a:round/>
-            <a:headEnd type="none" w="med" len="med"/>
-            <a:tailEnd type="triangle"/>
-          </a:ln>
-          <a:effectLst/>
-        </p:spPr>
-      </p:cxnSp>
+            <a:ln w="9525" cap="flat" cmpd="sng" algn="ctr">
+              <a:solidFill>
+                <a:schemeClr val="tx1"/>
+              </a:solidFill>
+              <a:prstDash val="solid"/>
+              <a:round/>
+              <a:headEnd type="none" w="med" len="med"/>
+              <a:tailEnd type="triangle"/>
+            </a:ln>
+            <a:effectLst/>
+          </p:spPr>
+        </p:cxnSp>
+      </p:grpSp>
     </p:spTree>
     <p:extLst>
       <p:ext uri="{BB962C8B-B14F-4D97-AF65-F5344CB8AC3E}">
@@ -7387,6 +7408,21 @@
 </file>
 
 <file path=customXml/item1.xml><?xml version="1.0" encoding="utf-8"?>
+<?mso-contentType ?>
+<FormTemplates xmlns="http://schemas.microsoft.com/sharepoint/v3/contenttype/forms">
+  <Display>DocumentLibraryForm</Display>
+  <Edit>DocumentLibraryForm</Edit>
+  <New>DocumentLibraryForm</New>
+</FormTemplates>
+</file>
+
+<file path=customXml/item2.xml><?xml version="1.0" encoding="utf-8"?>
+<p:properties xmlns:p="http://schemas.microsoft.com/office/2006/metadata/properties" xmlns:xsi="http://www.w3.org/2001/XMLSchema-instance" xmlns:pc="http://schemas.microsoft.com/office/infopath/2007/PartnerControls">
+  <documentManagement/>
+</p:properties>
+</file>
+
+<file path=customXml/item3.xml><?xml version="1.0" encoding="utf-8"?>
 <ct:contentTypeSchema xmlns:ct="http://schemas.microsoft.com/office/2006/metadata/contentType" xmlns:ma="http://schemas.microsoft.com/office/2006/metadata/properties/metaAttributes" ct:_="" ma:_="" ma:contentTypeName="Dokument" ma:contentTypeID="0x01010007E9DA9E47B96D4A9FF5869A522D2EBE" ma:contentTypeVersion="14" ma:contentTypeDescription="Ein neues Dokument erstellen." ma:contentTypeScope="" ma:versionID="c6b567c2eb3fec7b6e0779b66ade1c1d">
   <xsd:schema xmlns:xsd="http://www.w3.org/2001/XMLSchema" xmlns:xs="http://www.w3.org/2001/XMLSchema" xmlns:p="http://schemas.microsoft.com/office/2006/metadata/properties" xmlns:ns3="0c7ed570-c004-4df7-b924-f6f15cff9822" xmlns:ns4="fd3c8342-50e0-4f70-a5fe-1cf354f99926" targetNamespace="http://schemas.microsoft.com/office/2006/metadata/properties" ma:root="true" ma:fieldsID="cf608d3f30b78ea6f7b5008d854f34c9" ns3:_="" ns4:_="">
     <xsd:import namespace="0c7ed570-c004-4df7-b924-f6f15cff9822"/>
@@ -7615,36 +7651,10 @@
 </ct:contentTypeSchema>
 </file>
 
-<file path=customXml/item2.xml><?xml version="1.0" encoding="utf-8"?>
-<p:properties xmlns:p="http://schemas.microsoft.com/office/2006/metadata/properties" xmlns:xsi="http://www.w3.org/2001/XMLSchema-instance" xmlns:pc="http://schemas.microsoft.com/office/infopath/2007/PartnerControls">
-  <documentManagement/>
-</p:properties>
-</file>
-
-<file path=customXml/item3.xml><?xml version="1.0" encoding="utf-8"?>
-<?mso-contentType ?>
-<FormTemplates xmlns="http://schemas.microsoft.com/sharepoint/v3/contenttype/forms">
-  <Display>DocumentLibraryForm</Display>
-  <Edit>DocumentLibraryForm</Edit>
-  <New>DocumentLibraryForm</New>
-</FormTemplates>
-</file>
-
 <file path=customXml/itemProps1.xml><?xml version="1.0" encoding="utf-8"?>
-<ds:datastoreItem xmlns:ds="http://schemas.openxmlformats.org/officeDocument/2006/customXml" ds:itemID="{82D84E0E-EA78-4BD7-BB0A-CB2F5B4B4D89}">
+<ds:datastoreItem xmlns:ds="http://schemas.openxmlformats.org/officeDocument/2006/customXml" ds:itemID="{9FA18103-7F7B-4DF6-B5E4-0AF29ECCC122}">
   <ds:schemaRefs>
-    <ds:schemaRef ds:uri="http://schemas.microsoft.com/office/2006/metadata/contentType"/>
-    <ds:schemaRef ds:uri="http://schemas.microsoft.com/office/2006/metadata/properties/metaAttributes"/>
-    <ds:schemaRef ds:uri="http://www.w3.org/2001/XMLSchema"/>
-    <ds:schemaRef ds:uri="http://schemas.microsoft.com/office/2006/metadata/properties"/>
-    <ds:schemaRef ds:uri="0c7ed570-c004-4df7-b924-f6f15cff9822"/>
-    <ds:schemaRef ds:uri="fd3c8342-50e0-4f70-a5fe-1cf354f99926"/>
-    <ds:schemaRef ds:uri="http://schemas.microsoft.com/office/2006/documentManagement/types"/>
-    <ds:schemaRef ds:uri="http://schemas.microsoft.com/office/infopath/2007/PartnerControls"/>
-    <ds:schemaRef ds:uri="http://schemas.openxmlformats.org/package/2006/metadata/core-properties"/>
-    <ds:schemaRef ds:uri="http://purl.org/dc/elements/1.1/"/>
-    <ds:schemaRef ds:uri="http://purl.org/dc/terms/"/>
-    <ds:schemaRef ds:uri="http://schemas.microsoft.com/internal/obd"/>
+    <ds:schemaRef ds:uri="http://schemas.microsoft.com/sharepoint/v3/contenttype/forms"/>
   </ds:schemaRefs>
 </ds:datastoreItem>
 </file>
@@ -7667,9 +7677,20 @@
 </file>
 
 <file path=customXml/itemProps3.xml><?xml version="1.0" encoding="utf-8"?>
-<ds:datastoreItem xmlns:ds="http://schemas.openxmlformats.org/officeDocument/2006/customXml" ds:itemID="{9FA18103-7F7B-4DF6-B5E4-0AF29ECCC122}">
+<ds:datastoreItem xmlns:ds="http://schemas.openxmlformats.org/officeDocument/2006/customXml" ds:itemID="{82D84E0E-EA78-4BD7-BB0A-CB2F5B4B4D89}">
   <ds:schemaRefs>
-    <ds:schemaRef ds:uri="http://schemas.microsoft.com/sharepoint/v3/contenttype/forms"/>
+    <ds:schemaRef ds:uri="http://schemas.microsoft.com/office/2006/metadata/contentType"/>
+    <ds:schemaRef ds:uri="http://schemas.microsoft.com/office/2006/metadata/properties/metaAttributes"/>
+    <ds:schemaRef ds:uri="http://www.w3.org/2001/XMLSchema"/>
+    <ds:schemaRef ds:uri="http://schemas.microsoft.com/office/2006/metadata/properties"/>
+    <ds:schemaRef ds:uri="0c7ed570-c004-4df7-b924-f6f15cff9822"/>
+    <ds:schemaRef ds:uri="fd3c8342-50e0-4f70-a5fe-1cf354f99926"/>
+    <ds:schemaRef ds:uri="http://schemas.microsoft.com/office/2006/documentManagement/types"/>
+    <ds:schemaRef ds:uri="http://schemas.microsoft.com/office/infopath/2007/PartnerControls"/>
+    <ds:schemaRef ds:uri="http://schemas.openxmlformats.org/package/2006/metadata/core-properties"/>
+    <ds:schemaRef ds:uri="http://purl.org/dc/elements/1.1/"/>
+    <ds:schemaRef ds:uri="http://purl.org/dc/terms/"/>
+    <ds:schemaRef ds:uri="http://schemas.microsoft.com/internal/obd"/>
   </ds:schemaRefs>
 </ds:datastoreItem>
 </file>
</xml_diff>